<commit_message>
12-2 excel and poewrpoint generation updates
</commit_message>
<xml_diff>
--- a/outputs/output_ppt.pptx
+++ b/outputs/output_ppt.pptx
@@ -9,6 +9,8 @@
     <p:sldId id="257" r:id="rId8"/>
     <p:sldId id="258" r:id="rId9"/>
     <p:sldId id="259" r:id="rId10"/>
+    <p:sldId id="260" r:id="rId11"/>
+    <p:sldId id="261" r:id="rId12"/>
   </p:sldIdLst>
   <p:sldSz cx="9144000" cy="6858000" type="screen4x3"/>
   <p:notesSz cx="6858000" cy="9144000"/>
@@ -3107,8 +3109,7 @@
           <a:lstStyle/>
           <a:p>
             <a:r>
-              <a:rPr sz="1800"/>
-              <a:t>Financial Model</a:t>
+              <a:t>Business Plan Financial Analysis</a:t>
             </a:r>
           </a:p>
         </p:txBody>
@@ -3127,7 +3128,11 @@
         <p:txBody>
           <a:bodyPr/>
           <a:lstStyle/>
-          <a:p/>
+          <a:p>
+            <a:r>
+              <a:t>Financial Projections and Analysis</a:t>
+            </a:r>
+          </a:p>
         </p:txBody>
       </p:sp>
     </p:spTree>
@@ -3164,32 +3169,14 @@
           <a:lstStyle/>
           <a:p>
             <a:r>
-              <a:rPr sz="1800"/>
               <a:t>Revenue Sources</a:t>
             </a:r>
           </a:p>
-        </p:txBody>
-      </p:sp>
-      <p:sp>
-        <p:nvSpPr>
-          <p:cNvPr id="3" name="Content Placeholder 2"/>
-          <p:cNvSpPr>
-            <a:spLocks noGrp="1"/>
-          </p:cNvSpPr>
-          <p:nvPr>
-            <p:ph idx="1"/>
-          </p:nvPr>
-        </p:nvSpPr>
-        <p:spPr/>
-        <p:txBody>
-          <a:bodyPr/>
-          <a:lstStyle/>
-          <a:p/>
         </p:txBody>
       </p:sp>
       <p:graphicFrame>
         <p:nvGraphicFramePr>
-          <p:cNvPr id="4" name="Table 3"/>
+          <p:cNvPr id="3" name="Table 2"/>
           <p:cNvGraphicFramePr>
             <a:graphicFrameLocks noGrp="1"/>
           </p:cNvGraphicFramePr>
@@ -3206,9 +3193,10 @@
                 <a:tableStyleId>{5C22544A-7EE6-4342-B048-85BDC9FD1C3A}</a:tableStyleId>
               </a:tblPr>
               <a:tblGrid>
-                <a:gridCol w="2438400"/>
-                <a:gridCol w="2438400"/>
-                <a:gridCol w="2438400"/>
+                <a:gridCol w="1828800"/>
+                <a:gridCol w="1828800"/>
+                <a:gridCol w="1828800"/>
+                <a:gridCol w="1828800"/>
               </a:tblGrid>
               <a:tr h="609600">
                 <a:tc>
@@ -3268,6 +3256,25 @@
                   </a:txBody>
                   <a:tcPr/>
                 </a:tc>
+                <a:tc>
+                  <a:txBody>
+                    <a:bodyPr/>
+                    <a:lstStyle/>
+                    <a:p>
+                      <a:pPr>
+                        <a:defRPr b="1" sz="1400">
+                          <a:solidFill>
+                            <a:srgbClr val="FFFFFF"/>
+                          </a:solidFill>
+                        </a:defRPr>
+                      </a:pPr>
+                      <a:r>
+                        <a:t>Source</a:t>
+                      </a:r>
+                    </a:p>
+                  </a:txBody>
+                  <a:tcPr/>
+                </a:tc>
               </a:tr>
               <a:tr h="609600">
                 <a:tc>
@@ -3275,32 +3282,56 @@
                     <a:bodyPr/>
                     <a:lstStyle/>
                     <a:p>
-                      <a:r>
-                        <a:t>Construction Management</a:t>
-                      </a:r>
-                    </a:p>
-                  </a:txBody>
-                  <a:tcPr/>
-                </a:tc>
-                <a:tc>
-                  <a:txBody>
-                    <a:bodyPr/>
-                    <a:lstStyle/>
-                    <a:p>
-                      <a:r>
-                        <a:t>$1.2</a:t>
-                      </a:r>
-                    </a:p>
-                  </a:txBody>
-                  <a:tcPr/>
-                </a:tc>
-                <a:tc>
-                  <a:txBody>
-                    <a:bodyPr/>
-                    <a:lstStyle/>
-                    <a:p>
-                      <a:r>
-                        <a:t>30</a:t>
+                      <a:pPr>
+                        <a:defRPr sz="1200"/>
+                      </a:pPr>
+                      <a:r>
+                        <a:t>Infrastructure Projects</a:t>
+                      </a:r>
+                    </a:p>
+                  </a:txBody>
+                  <a:tcPr/>
+                </a:tc>
+                <a:tc>
+                  <a:txBody>
+                    <a:bodyPr/>
+                    <a:lstStyle/>
+                    <a:p>
+                      <a:pPr>
+                        <a:defRPr sz="1200"/>
+                      </a:pPr>
+                      <a:r>
+                        <a:t>$200000</a:t>
+                      </a:r>
+                    </a:p>
+                  </a:txBody>
+                  <a:tcPr/>
+                </a:tc>
+                <a:tc>
+                  <a:txBody>
+                    <a:bodyPr/>
+                    <a:lstStyle/>
+                    <a:p>
+                      <a:pPr>
+                        <a:defRPr sz="1200"/>
+                      </a:pPr>
+                      <a:r>
+                        <a:t>5</a:t>
+                      </a:r>
+                    </a:p>
+                  </a:txBody>
+                  <a:tcPr/>
+                </a:tc>
+                <a:tc>
+                  <a:txBody>
+                    <a:bodyPr/>
+                    <a:lstStyle/>
+                    <a:p>
+                      <a:pPr>
+                        <a:defRPr sz="1200"/>
+                      </a:pPr>
+                      <a:r>
+                        <a:t>Competitive analysis</a:t>
                       </a:r>
                     </a:p>
                   </a:txBody>
@@ -3313,6 +3344,9 @@
                     <a:bodyPr/>
                     <a:lstStyle/>
                     <a:p>
+                      <a:pPr>
+                        <a:defRPr sz="1200"/>
+                      </a:pPr>
                       <a:r>
                         <a:t>Environmental Remediation</a:t>
                       </a:r>
@@ -3325,20 +3359,41 @@
                     <a:bodyPr/>
                     <a:lstStyle/>
                     <a:p>
-                      <a:r>
-                        <a:t>$2.0</a:t>
-                      </a:r>
-                    </a:p>
-                  </a:txBody>
-                  <a:tcPr/>
-                </a:tc>
-                <a:tc>
-                  <a:txBody>
-                    <a:bodyPr/>
-                    <a:lstStyle/>
-                    <a:p>
-                      <a:r>
-                        <a:t>20</a:t>
+                      <a:pPr>
+                        <a:defRPr sz="1200"/>
+                      </a:pPr>
+                      <a:r>
+                        <a:t>$150000</a:t>
+                      </a:r>
+                    </a:p>
+                  </a:txBody>
+                  <a:tcPr/>
+                </a:tc>
+                <a:tc>
+                  <a:txBody>
+                    <a:bodyPr/>
+                    <a:lstStyle/>
+                    <a:p>
+                      <a:pPr>
+                        <a:defRPr sz="1200"/>
+                      </a:pPr>
+                      <a:r>
+                        <a:t>7</a:t>
+                      </a:r>
+                    </a:p>
+                  </a:txBody>
+                  <a:tcPr/>
+                </a:tc>
+                <a:tc>
+                  <a:txBody>
+                    <a:bodyPr/>
+                    <a:lstStyle/>
+                    <a:p>
+                      <a:pPr>
+                        <a:defRPr sz="1200"/>
+                      </a:pPr>
+                      <a:r>
+                        <a:t>Industry guide</a:t>
                       </a:r>
                     </a:p>
                   </a:txBody>
@@ -3351,32 +3406,56 @@
                     <a:bodyPr/>
                     <a:lstStyle/>
                     <a:p>
-                      <a:r>
-                        <a:t>Civil Engineering</a:t>
-                      </a:r>
-                    </a:p>
-                  </a:txBody>
-                  <a:tcPr/>
-                </a:tc>
-                <a:tc>
-                  <a:txBody>
-                    <a:bodyPr/>
-                    <a:lstStyle/>
-                    <a:p>
-                      <a:r>
-                        <a:t>$1.8</a:t>
-                      </a:r>
-                    </a:p>
-                  </a:txBody>
-                  <a:tcPr/>
-                </a:tc>
-                <a:tc>
-                  <a:txBody>
-                    <a:bodyPr/>
-                    <a:lstStyle/>
-                    <a:p>
-                      <a:r>
-                        <a:t>15</a:t>
+                      <a:pPr>
+                        <a:defRPr sz="1200"/>
+                      </a:pPr>
+                      <a:r>
+                        <a:t>Demolition Services</a:t>
+                      </a:r>
+                    </a:p>
+                  </a:txBody>
+                  <a:tcPr/>
+                </a:tc>
+                <a:tc>
+                  <a:txBody>
+                    <a:bodyPr/>
+                    <a:lstStyle/>
+                    <a:p>
+                      <a:pPr>
+                        <a:defRPr sz="1200"/>
+                      </a:pPr>
+                      <a:r>
+                        <a:t>$75000</a:t>
+                      </a:r>
+                    </a:p>
+                  </a:txBody>
+                  <a:tcPr/>
+                </a:tc>
+                <a:tc>
+                  <a:txBody>
+                    <a:bodyPr/>
+                    <a:lstStyle/>
+                    <a:p>
+                      <a:pPr>
+                        <a:defRPr sz="1200"/>
+                      </a:pPr>
+                      <a:r>
+                        <a:t>10</a:t>
+                      </a:r>
+                    </a:p>
+                  </a:txBody>
+                  <a:tcPr/>
+                </a:tc>
+                <a:tc>
+                  <a:txBody>
+                    <a:bodyPr/>
+                    <a:lstStyle/>
+                    <a:p>
+                      <a:pPr>
+                        <a:defRPr sz="1200"/>
+                      </a:pPr>
+                      <a:r>
+                        <a:t>Project bids</a:t>
                       </a:r>
                     </a:p>
                   </a:txBody>
@@ -3389,32 +3468,56 @@
                     <a:bodyPr/>
                     <a:lstStyle/>
                     <a:p>
-                      <a:r>
-                        <a:t>Demolition Services</a:t>
-                      </a:r>
-                    </a:p>
-                  </a:txBody>
-                  <a:tcPr/>
-                </a:tc>
-                <a:tc>
-                  <a:txBody>
-                    <a:bodyPr/>
-                    <a:lstStyle/>
-                    <a:p>
-                      <a:r>
-                        <a:t>$1.5</a:t>
-                      </a:r>
-                    </a:p>
-                  </a:txBody>
-                  <a:tcPr/>
-                </a:tc>
-                <a:tc>
-                  <a:txBody>
-                    <a:bodyPr/>
-                    <a:lstStyle/>
-                    <a:p>
-                      <a:r>
-                        <a:t>10</a:t>
+                      <a:pPr>
+                        <a:defRPr sz="1200"/>
+                      </a:pPr>
+                      <a:r>
+                        <a:t>Construction Management</a:t>
+                      </a:r>
+                    </a:p>
+                  </a:txBody>
+                  <a:tcPr/>
+                </a:tc>
+                <a:tc>
+                  <a:txBody>
+                    <a:bodyPr/>
+                    <a:lstStyle/>
+                    <a:p>
+                      <a:pPr>
+                        <a:defRPr sz="1200"/>
+                      </a:pPr>
+                      <a:r>
+                        <a:t>$250000</a:t>
+                      </a:r>
+                    </a:p>
+                  </a:txBody>
+                  <a:tcPr/>
+                </a:tc>
+                <a:tc>
+                  <a:txBody>
+                    <a:bodyPr/>
+                    <a:lstStyle/>
+                    <a:p>
+                      <a:pPr>
+                        <a:defRPr sz="1200"/>
+                      </a:pPr>
+                      <a:r>
+                        <a:t>3</a:t>
+                      </a:r>
+                    </a:p>
+                  </a:txBody>
+                  <a:tcPr/>
+                </a:tc>
+                <a:tc>
+                  <a:txBody>
+                    <a:bodyPr/>
+                    <a:lstStyle/>
+                    <a:p>
+                      <a:pPr>
+                        <a:defRPr sz="1200"/>
+                      </a:pPr>
+                      <a:r>
+                        <a:t>Contractor benchmark</a:t>
                       </a:r>
                     </a:p>
                   </a:txBody>
@@ -3427,32 +3530,56 @@
                     <a:bodyPr/>
                     <a:lstStyle/>
                     <a:p>
-                      <a:r>
-                        <a:t>Site Remediation</a:t>
-                      </a:r>
-                    </a:p>
-                  </a:txBody>
-                  <a:tcPr/>
-                </a:tc>
-                <a:tc>
-                  <a:txBody>
-                    <a:bodyPr/>
-                    <a:lstStyle/>
-                    <a:p>
-                      <a:r>
-                        <a:t>$1.7</a:t>
-                      </a:r>
-                    </a:p>
-                  </a:txBody>
-                  <a:tcPr/>
-                </a:tc>
-                <a:tc>
-                  <a:txBody>
-                    <a:bodyPr/>
-                    <a:lstStyle/>
-                    <a:p>
+                      <a:pPr>
+                        <a:defRPr sz="1200"/>
+                      </a:pPr>
+                      <a:r>
+                        <a:t>Civil Engineering Consultancy</a:t>
+                      </a:r>
+                    </a:p>
+                  </a:txBody>
+                  <a:tcPr/>
+                </a:tc>
+                <a:tc>
+                  <a:txBody>
+                    <a:bodyPr/>
+                    <a:lstStyle/>
+                    <a:p>
+                      <a:pPr>
+                        <a:defRPr sz="1200"/>
+                      </a:pPr>
+                      <a:r>
+                        <a:t>$100000</a:t>
+                      </a:r>
+                    </a:p>
+                  </a:txBody>
+                  <a:tcPr/>
+                </a:tc>
+                <a:tc>
+                  <a:txBody>
+                    <a:bodyPr/>
+                    <a:lstStyle/>
+                    <a:p>
+                      <a:pPr>
+                        <a:defRPr sz="1200"/>
+                      </a:pPr>
                       <a:r>
                         <a:t>8</a:t>
+                      </a:r>
+                    </a:p>
+                  </a:txBody>
+                  <a:tcPr/>
+                </a:tc>
+                <a:tc>
+                  <a:txBody>
+                    <a:bodyPr/>
+                    <a:lstStyle/>
+                    <a:p>
+                      <a:pPr>
+                        <a:defRPr sz="1200"/>
+                      </a:pPr>
+                      <a:r>
+                        <a:t>Consultation pricing document</a:t>
                       </a:r>
                     </a:p>
                   </a:txBody>
@@ -3497,32 +3624,14 @@
           <a:lstStyle/>
           <a:p>
             <a:r>
-              <a:rPr sz="1800"/>
-              <a:t>Operating Expenses</a:t>
-            </a:r>
-          </a:p>
-        </p:txBody>
-      </p:sp>
-      <p:sp>
-        <p:nvSpPr>
-          <p:cNvPr id="3" name="Content Placeholder 2"/>
-          <p:cNvSpPr>
-            <a:spLocks noGrp="1"/>
-          </p:cNvSpPr>
-          <p:nvPr>
-            <p:ph idx="1"/>
-          </p:nvPr>
-        </p:nvSpPr>
-        <p:spPr/>
-        <p:txBody>
-          <a:bodyPr/>
-          <a:lstStyle/>
-          <a:p/>
+              <a:t>Cost of Sales</a:t>
+            </a:r>
+          </a:p>
         </p:txBody>
       </p:sp>
       <p:graphicFrame>
         <p:nvGraphicFramePr>
-          <p:cNvPr id="4" name="Table 3"/>
+          <p:cNvPr id="3" name="Table 2"/>
           <p:cNvGraphicFramePr>
             <a:graphicFrameLocks noGrp="1"/>
           </p:cNvGraphicFramePr>
@@ -3530,7 +3639,7 @@
         </p:nvGraphicFramePr>
         <p:xfrm>
           <a:off x="914400" y="1371600"/>
-          <a:ext cx="7315200" cy="2743200"/>
+          <a:ext cx="7315200" cy="3657600"/>
         </p:xfrm>
         <a:graphic>
           <a:graphicData uri="http://schemas.openxmlformats.org/drawingml/2006/table">
@@ -3539,11 +3648,12 @@
                 <a:tableStyleId>{5C22544A-7EE6-4342-B048-85BDC9FD1C3A}</a:tableStyleId>
               </a:tblPr>
               <a:tblGrid>
-                <a:gridCol w="2438400"/>
-                <a:gridCol w="2438400"/>
-                <a:gridCol w="2438400"/>
+                <a:gridCol w="1828800"/>
+                <a:gridCol w="1828800"/>
+                <a:gridCol w="1828800"/>
+                <a:gridCol w="1828800"/>
               </a:tblGrid>
-              <a:tr h="457200">
+              <a:tr h="609600">
                 <a:tc>
                   <a:txBody>
                     <a:bodyPr/>
@@ -3557,7 +3667,7 @@
                         </a:defRPr>
                       </a:pPr>
                       <a:r>
-                        <a:t>Expense Name</a:t>
+                        <a:t>Cost Item</a:t>
                       </a:r>
                     </a:p>
                   </a:txBody>
@@ -3576,7 +3686,7 @@
                         </a:defRPr>
                       </a:pPr>
                       <a:r>
-                        <a:t>Amount</a:t>
+                        <a:t>Cost per Unit</a:t>
                       </a:r>
                     </a:p>
                   </a:txBody>
@@ -3595,197 +3705,336 @@
                         </a:defRPr>
                       </a:pPr>
                       <a:r>
-                        <a:t>Frequency</a:t>
+                        <a:t>Monthly Units</a:t>
+                      </a:r>
+                    </a:p>
+                  </a:txBody>
+                  <a:tcPr/>
+                </a:tc>
+                <a:tc>
+                  <a:txBody>
+                    <a:bodyPr/>
+                    <a:lstStyle/>
+                    <a:p>
+                      <a:pPr>
+                        <a:defRPr b="1" sz="1400">
+                          <a:solidFill>
+                            <a:srgbClr val="FFFFFF"/>
+                          </a:solidFill>
+                        </a:defRPr>
+                      </a:pPr>
+                      <a:r>
+                        <a:t>Source</a:t>
                       </a:r>
                     </a:p>
                   </a:txBody>
                   <a:tcPr/>
                 </a:tc>
               </a:tr>
-              <a:tr h="457200">
-                <a:tc>
-                  <a:txBody>
-                    <a:bodyPr/>
-                    <a:lstStyle/>
-                    <a:p>
-                      <a:r>
-                        <a:t>Utility Costs</a:t>
-                      </a:r>
-                    </a:p>
-                  </a:txBody>
-                  <a:tcPr/>
-                </a:tc>
-                <a:tc>
-                  <a:txBody>
-                    <a:bodyPr/>
-                    <a:lstStyle/>
-                    <a:p>
-                      <a:r>
-                        <a:t>$75000</a:t>
-                      </a:r>
-                    </a:p>
-                  </a:txBody>
-                  <a:tcPr/>
-                </a:tc>
-                <a:tc>
-                  <a:txBody>
-                    <a:bodyPr/>
-                    <a:lstStyle/>
-                    <a:p>
-                      <a:r>
-                        <a:t>annually</a:t>
+              <a:tr h="609600">
+                <a:tc>
+                  <a:txBody>
+                    <a:bodyPr/>
+                    <a:lstStyle/>
+                    <a:p>
+                      <a:pPr>
+                        <a:defRPr sz="1200"/>
+                      </a:pPr>
+                      <a:r>
+                        <a:t>Subcontractor Services</a:t>
+                      </a:r>
+                    </a:p>
+                  </a:txBody>
+                  <a:tcPr/>
+                </a:tc>
+                <a:tc>
+                  <a:txBody>
+                    <a:bodyPr/>
+                    <a:lstStyle/>
+                    <a:p>
+                      <a:pPr>
+                        <a:defRPr sz="1200"/>
+                      </a:pPr>
+                      <a:r>
+                        <a:t>$15000</a:t>
+                      </a:r>
+                    </a:p>
+                  </a:txBody>
+                  <a:tcPr/>
+                </a:tc>
+                <a:tc>
+                  <a:txBody>
+                    <a:bodyPr/>
+                    <a:lstStyle/>
+                    <a:p>
+                      <a:pPr>
+                        <a:defRPr sz="1200"/>
+                      </a:pPr>
+                      <a:r>
+                        <a:t>30</a:t>
+                      </a:r>
+                    </a:p>
+                  </a:txBody>
+                  <a:tcPr/>
+                </a:tc>
+                <a:tc>
+                  <a:txBody>
+                    <a:bodyPr/>
+                    <a:lstStyle/>
+                    <a:p>
+                      <a:pPr>
+                        <a:defRPr sz="1200"/>
+                      </a:pPr>
+                      <a:r>
+                        <a:t>Industry standard</a:t>
                       </a:r>
                     </a:p>
                   </a:txBody>
                   <a:tcPr/>
                 </a:tc>
               </a:tr>
-              <a:tr h="457200">
-                <a:tc>
-                  <a:txBody>
-                    <a:bodyPr/>
-                    <a:lstStyle/>
-                    <a:p>
-                      <a:r>
-                        <a:t>Insurance</a:t>
-                      </a:r>
-                    </a:p>
-                  </a:txBody>
-                  <a:tcPr/>
-                </a:tc>
-                <a:tc>
-                  <a:txBody>
-                    <a:bodyPr/>
-                    <a:lstStyle/>
-                    <a:p>
-                      <a:r>
-                        <a:t>$95000</a:t>
-                      </a:r>
-                    </a:p>
-                  </a:txBody>
-                  <a:tcPr/>
-                </a:tc>
-                <a:tc>
-                  <a:txBody>
-                    <a:bodyPr/>
-                    <a:lstStyle/>
-                    <a:p>
-                      <a:r>
-                        <a:t>annually</a:t>
+              <a:tr h="609600">
+                <a:tc>
+                  <a:txBody>
+                    <a:bodyPr/>
+                    <a:lstStyle/>
+                    <a:p>
+                      <a:pPr>
+                        <a:defRPr sz="1200"/>
+                      </a:pPr>
+                      <a:r>
+                        <a:t>Construction Materials</a:t>
+                      </a:r>
+                    </a:p>
+                  </a:txBody>
+                  <a:tcPr/>
+                </a:tc>
+                <a:tc>
+                  <a:txBody>
+                    <a:bodyPr/>
+                    <a:lstStyle/>
+                    <a:p>
+                      <a:pPr>
+                        <a:defRPr sz="1200"/>
+                      </a:pPr>
+                      <a:r>
+                        <a:t>$5000</a:t>
+                      </a:r>
+                    </a:p>
+                  </a:txBody>
+                  <a:tcPr/>
+                </a:tc>
+                <a:tc>
+                  <a:txBody>
+                    <a:bodyPr/>
+                    <a:lstStyle/>
+                    <a:p>
+                      <a:pPr>
+                        <a:defRPr sz="1200"/>
+                      </a:pPr>
+                      <a:r>
+                        <a:t>120</a:t>
+                      </a:r>
+                    </a:p>
+                  </a:txBody>
+                  <a:tcPr/>
+                </a:tc>
+                <a:tc>
+                  <a:txBody>
+                    <a:bodyPr/>
+                    <a:lstStyle/>
+                    <a:p>
+                      <a:pPr>
+                        <a:defRPr sz="1200"/>
+                      </a:pPr>
+                      <a:r>
+                        <a:t>Vendor list pricing</a:t>
                       </a:r>
                     </a:p>
                   </a:txBody>
                   <a:tcPr/>
                 </a:tc>
               </a:tr>
-              <a:tr h="457200">
-                <a:tc>
-                  <a:txBody>
-                    <a:bodyPr/>
-                    <a:lstStyle/>
-                    <a:p>
-                      <a:r>
-                        <a:t>Office Supplies</a:t>
-                      </a:r>
-                    </a:p>
-                  </a:txBody>
-                  <a:tcPr/>
-                </a:tc>
-                <a:tc>
-                  <a:txBody>
-                    <a:bodyPr/>
-                    <a:lstStyle/>
-                    <a:p>
-                      <a:r>
-                        <a:t>$15000</a:t>
-                      </a:r>
-                    </a:p>
-                  </a:txBody>
-                  <a:tcPr/>
-                </a:tc>
-                <a:tc>
-                  <a:txBody>
-                    <a:bodyPr/>
-                    <a:lstStyle/>
-                    <a:p>
-                      <a:r>
-                        <a:t>annually</a:t>
+              <a:tr h="609600">
+                <a:tc>
+                  <a:txBody>
+                    <a:bodyPr/>
+                    <a:lstStyle/>
+                    <a:p>
+                      <a:pPr>
+                        <a:defRPr sz="1200"/>
+                      </a:pPr>
+                      <a:r>
+                        <a:t>Equipment Rentals</a:t>
+                      </a:r>
+                    </a:p>
+                  </a:txBody>
+                  <a:tcPr/>
+                </a:tc>
+                <a:tc>
+                  <a:txBody>
+                    <a:bodyPr/>
+                    <a:lstStyle/>
+                    <a:p>
+                      <a:pPr>
+                        <a:defRPr sz="1200"/>
+                      </a:pPr>
+                      <a:r>
+                        <a:t>$750</a:t>
+                      </a:r>
+                    </a:p>
+                  </a:txBody>
+                  <a:tcPr/>
+                </a:tc>
+                <a:tc>
+                  <a:txBody>
+                    <a:bodyPr/>
+                    <a:lstStyle/>
+                    <a:p>
+                      <a:pPr>
+                        <a:defRPr sz="1200"/>
+                      </a:pPr>
+                      <a:r>
+                        <a:t>50</a:t>
+                      </a:r>
+                    </a:p>
+                  </a:txBody>
+                  <a:tcPr/>
+                </a:tc>
+                <a:tc>
+                  <a:txBody>
+                    <a:bodyPr/>
+                    <a:lstStyle/>
+                    <a:p>
+                      <a:pPr>
+                        <a:defRPr sz="1200"/>
+                      </a:pPr>
+                      <a:r>
+                        <a:t>Rental company contracts</a:t>
                       </a:r>
                     </a:p>
                   </a:txBody>
                   <a:tcPr/>
                 </a:tc>
               </a:tr>
-              <a:tr h="457200">
-                <a:tc>
-                  <a:txBody>
-                    <a:bodyPr/>
-                    <a:lstStyle/>
-                    <a:p>
-                      <a:r>
-                        <a:t>Travel Expenses</a:t>
-                      </a:r>
-                    </a:p>
-                  </a:txBody>
-                  <a:tcPr/>
-                </a:tc>
-                <a:tc>
-                  <a:txBody>
-                    <a:bodyPr/>
-                    <a:lstStyle/>
-                    <a:p>
-                      <a:r>
-                        <a:t>$50000</a:t>
-                      </a:r>
-                    </a:p>
-                  </a:txBody>
-                  <a:tcPr/>
-                </a:tc>
-                <a:tc>
-                  <a:txBody>
-                    <a:bodyPr/>
-                    <a:lstStyle/>
-                    <a:p>
-                      <a:r>
-                        <a:t>annually</a:t>
+              <a:tr h="609600">
+                <a:tc>
+                  <a:txBody>
+                    <a:bodyPr/>
+                    <a:lstStyle/>
+                    <a:p>
+                      <a:pPr>
+                        <a:defRPr sz="1200"/>
+                      </a:pPr>
+                      <a:r>
+                        <a:t>Labor and Payroll Taxes</a:t>
+                      </a:r>
+                    </a:p>
+                  </a:txBody>
+                  <a:tcPr/>
+                </a:tc>
+                <a:tc>
+                  <a:txBody>
+                    <a:bodyPr/>
+                    <a:lstStyle/>
+                    <a:p>
+                      <a:pPr>
+                        <a:defRPr sz="1200"/>
+                      </a:pPr>
+                      <a:r>
+                        <a:t>$20000</a:t>
+                      </a:r>
+                    </a:p>
+                  </a:txBody>
+                  <a:tcPr/>
+                </a:tc>
+                <a:tc>
+                  <a:txBody>
+                    <a:bodyPr/>
+                    <a:lstStyle/>
+                    <a:p>
+                      <a:pPr>
+                        <a:defRPr sz="1200"/>
+                      </a:pPr>
+                      <a:r>
+                        <a:t>42</a:t>
+                      </a:r>
+                    </a:p>
+                  </a:txBody>
+                  <a:tcPr/>
+                </a:tc>
+                <a:tc>
+                  <a:txBody>
+                    <a:bodyPr/>
+                    <a:lstStyle/>
+                    <a:p>
+                      <a:pPr>
+                        <a:defRPr sz="1200"/>
+                      </a:pPr>
+                      <a:r>
+                        <a:t>HR compensation survey</a:t>
                       </a:r>
                     </a:p>
                   </a:txBody>
                   <a:tcPr/>
                 </a:tc>
               </a:tr>
-              <a:tr h="457200">
-                <a:tc>
-                  <a:txBody>
-                    <a:bodyPr/>
-                    <a:lstStyle/>
-                    <a:p>
-                      <a:r>
-                        <a:t>Professional Fees</a:t>
-                      </a:r>
-                    </a:p>
-                  </a:txBody>
-                  <a:tcPr/>
-                </a:tc>
-                <a:tc>
-                  <a:txBody>
-                    <a:bodyPr/>
-                    <a:lstStyle/>
-                    <a:p>
-                      <a:r>
-                        <a:t>$60000</a:t>
-                      </a:r>
-                    </a:p>
-                  </a:txBody>
-                  <a:tcPr/>
-                </a:tc>
-                <a:tc>
-                  <a:txBody>
-                    <a:bodyPr/>
-                    <a:lstStyle/>
-                    <a:p>
-                      <a:r>
-                        <a:t>annually</a:t>
+              <a:tr h="609600">
+                <a:tc>
+                  <a:txBody>
+                    <a:bodyPr/>
+                    <a:lstStyle/>
+                    <a:p>
+                      <a:pPr>
+                        <a:defRPr sz="1200"/>
+                      </a:pPr>
+                      <a:r>
+                        <a:t>Transportation and Disposal Fees</a:t>
+                      </a:r>
+                    </a:p>
+                  </a:txBody>
+                  <a:tcPr/>
+                </a:tc>
+                <a:tc>
+                  <a:txBody>
+                    <a:bodyPr/>
+                    <a:lstStyle/>
+                    <a:p>
+                      <a:pPr>
+                        <a:defRPr sz="1200"/>
+                      </a:pPr>
+                      <a:r>
+                        <a:t>$3000</a:t>
+                      </a:r>
+                    </a:p>
+                  </a:txBody>
+                  <a:tcPr/>
+                </a:tc>
+                <a:tc>
+                  <a:txBody>
+                    <a:bodyPr/>
+                    <a:lstStyle/>
+                    <a:p>
+                      <a:pPr>
+                        <a:defRPr sz="1200"/>
+                      </a:pPr>
+                      <a:r>
+                        <a:t>35</a:t>
+                      </a:r>
+                    </a:p>
+                  </a:txBody>
+                  <a:tcPr/>
+                </a:tc>
+                <a:tc>
+                  <a:txBody>
+                    <a:bodyPr/>
+                    <a:lstStyle/>
+                    <a:p>
+                      <a:pPr>
+                        <a:defRPr sz="1200"/>
+                      </a:pPr>
+                      <a:r>
+                        <a:t>Logistics contract</a:t>
                       </a:r>
                     </a:p>
                   </a:txBody>
@@ -3830,59 +4079,1242 @@
           <a:lstStyle/>
           <a:p>
             <a:r>
-              <a:rPr sz="1800"/>
-              <a:t>Capital Expenditures</a:t>
-            </a:r>
-          </a:p>
-        </p:txBody>
-      </p:sp>
-      <p:sp>
-        <p:nvSpPr>
-          <p:cNvPr id="3" name="Content Placeholder 2"/>
-          <p:cNvSpPr>
-            <a:spLocks noGrp="1"/>
-          </p:cNvSpPr>
-          <p:nvPr>
-            <p:ph idx="1"/>
+              <a:t>Employee Overview</a:t>
+            </a:r>
+          </a:p>
+        </p:txBody>
+      </p:sp>
+      <p:graphicFrame>
+        <p:nvGraphicFramePr>
+          <p:cNvPr id="3" name="Table 2"/>
+          <p:cNvGraphicFramePr>
+            <a:graphicFrameLocks noGrp="1"/>
+          </p:cNvGraphicFramePr>
+          <p:nvPr/>
+        </p:nvGraphicFramePr>
+        <p:xfrm>
+          <a:off x="914400" y="1371600"/>
+          <a:ext cx="7315200" cy="3657600"/>
+        </p:xfrm>
+        <a:graphic>
+          <a:graphicData uri="http://schemas.openxmlformats.org/drawingml/2006/table">
+            <a:tbl>
+              <a:tblPr firstRow="1" bandRow="1">
+                <a:tableStyleId>{5C22544A-7EE6-4342-B048-85BDC9FD1C3A}</a:tableStyleId>
+              </a:tblPr>
+              <a:tblGrid>
+                <a:gridCol w="1828800"/>
+                <a:gridCol w="1828800"/>
+                <a:gridCol w="1828800"/>
+                <a:gridCol w="1828800"/>
+              </a:tblGrid>
+              <a:tr h="609600">
+                <a:tc>
+                  <a:txBody>
+                    <a:bodyPr/>
+                    <a:lstStyle/>
+                    <a:p>
+                      <a:pPr>
+                        <a:defRPr b="1" sz="1400">
+                          <a:solidFill>
+                            <a:srgbClr val="FFFFFF"/>
+                          </a:solidFill>
+                        </a:defRPr>
+                      </a:pPr>
+                      <a:r>
+                        <a:t>Role</a:t>
+                      </a:r>
+                    </a:p>
+                  </a:txBody>
+                  <a:tcPr/>
+                </a:tc>
+                <a:tc>
+                  <a:txBody>
+                    <a:bodyPr/>
+                    <a:lstStyle/>
+                    <a:p>
+                      <a:pPr>
+                        <a:defRPr b="1" sz="1400">
+                          <a:solidFill>
+                            <a:srgbClr val="FFFFFF"/>
+                          </a:solidFill>
+                        </a:defRPr>
+                      </a:pPr>
+                      <a:r>
+                        <a:t>Number</a:t>
+                      </a:r>
+                    </a:p>
+                  </a:txBody>
+                  <a:tcPr/>
+                </a:tc>
+                <a:tc>
+                  <a:txBody>
+                    <a:bodyPr/>
+                    <a:lstStyle/>
+                    <a:p>
+                      <a:pPr>
+                        <a:defRPr b="1" sz="1400">
+                          <a:solidFill>
+                            <a:srgbClr val="FFFFFF"/>
+                          </a:solidFill>
+                        </a:defRPr>
+                      </a:pPr>
+                      <a:r>
+                        <a:t>Wage</a:t>
+                      </a:r>
+                    </a:p>
+                  </a:txBody>
+                  <a:tcPr/>
+                </a:tc>
+                <a:tc>
+                  <a:txBody>
+                    <a:bodyPr/>
+                    <a:lstStyle/>
+                    <a:p>
+                      <a:pPr>
+                        <a:defRPr b="1" sz="1400">
+                          <a:solidFill>
+                            <a:srgbClr val="FFFFFF"/>
+                          </a:solidFill>
+                        </a:defRPr>
+                      </a:pPr>
+                      <a:r>
+                        <a:t>Monthly Hours</a:t>
+                      </a:r>
+                    </a:p>
+                  </a:txBody>
+                  <a:tcPr/>
+                </a:tc>
+              </a:tr>
+              <a:tr h="609600">
+                <a:tc>
+                  <a:txBody>
+                    <a:bodyPr/>
+                    <a:lstStyle/>
+                    <a:p>
+                      <a:pPr>
+                        <a:defRPr sz="1200"/>
+                      </a:pPr>
+                      <a:r>
+                        <a:t>Project Manager</a:t>
+                      </a:r>
+                    </a:p>
+                  </a:txBody>
+                  <a:tcPr/>
+                </a:tc>
+                <a:tc>
+                  <a:txBody>
+                    <a:bodyPr/>
+                    <a:lstStyle/>
+                    <a:p>
+                      <a:pPr>
+                        <a:defRPr sz="1200"/>
+                      </a:pPr>
+                      <a:r>
+                        <a:t>6</a:t>
+                      </a:r>
+                    </a:p>
+                  </a:txBody>
+                  <a:tcPr/>
+                </a:tc>
+                <a:tc>
+                  <a:txBody>
+                    <a:bodyPr/>
+                    <a:lstStyle/>
+                    <a:p>
+                      <a:pPr>
+                        <a:defRPr sz="1200"/>
+                      </a:pPr>
+                      <a:r>
+                        <a:t>$105000/yr</a:t>
+                      </a:r>
+                    </a:p>
+                  </a:txBody>
+                  <a:tcPr/>
+                </a:tc>
+                <a:tc>
+                  <a:txBody>
+                    <a:bodyPr/>
+                    <a:lstStyle/>
+                    <a:p>
+                      <a:pPr>
+                        <a:defRPr sz="1200"/>
+                      </a:pPr>
+                      <a:r>
+                        <a:t>160</a:t>
+                      </a:r>
+                    </a:p>
+                  </a:txBody>
+                  <a:tcPr/>
+                </a:tc>
+              </a:tr>
+              <a:tr h="609600">
+                <a:tc>
+                  <a:txBody>
+                    <a:bodyPr/>
+                    <a:lstStyle/>
+                    <a:p>
+                      <a:pPr>
+                        <a:defRPr sz="1200"/>
+                      </a:pPr>
+                      <a:r>
+                        <a:t>Site Superintendent</a:t>
+                      </a:r>
+                    </a:p>
+                  </a:txBody>
+                  <a:tcPr/>
+                </a:tc>
+                <a:tc>
+                  <a:txBody>
+                    <a:bodyPr/>
+                    <a:lstStyle/>
+                    <a:p>
+                      <a:pPr>
+                        <a:defRPr sz="1200"/>
+                      </a:pPr>
+                      <a:r>
+                        <a:t>14</a:t>
+                      </a:r>
+                    </a:p>
+                  </a:txBody>
+                  <a:tcPr/>
+                </a:tc>
+                <a:tc>
+                  <a:txBody>
+                    <a:bodyPr/>
+                    <a:lstStyle/>
+                    <a:p>
+                      <a:pPr>
+                        <a:defRPr sz="1200"/>
+                      </a:pPr>
+                      <a:r>
+                        <a:t>$80000/yr</a:t>
+                      </a:r>
+                    </a:p>
+                  </a:txBody>
+                  <a:tcPr/>
+                </a:tc>
+                <a:tc>
+                  <a:txBody>
+                    <a:bodyPr/>
+                    <a:lstStyle/>
+                    <a:p>
+                      <a:pPr>
+                        <a:defRPr sz="1200"/>
+                      </a:pPr>
+                      <a:r>
+                        <a:t>160</a:t>
+                      </a:r>
+                    </a:p>
+                  </a:txBody>
+                  <a:tcPr/>
+                </a:tc>
+              </a:tr>
+              <a:tr h="609600">
+                <a:tc>
+                  <a:txBody>
+                    <a:bodyPr/>
+                    <a:lstStyle/>
+                    <a:p>
+                      <a:pPr>
+                        <a:defRPr sz="1200"/>
+                      </a:pPr>
+                      <a:r>
+                        <a:t>Quality Control Specialist</a:t>
+                      </a:r>
+                    </a:p>
+                  </a:txBody>
+                  <a:tcPr/>
+                </a:tc>
+                <a:tc>
+                  <a:txBody>
+                    <a:bodyPr/>
+                    <a:lstStyle/>
+                    <a:p>
+                      <a:pPr>
+                        <a:defRPr sz="1200"/>
+                      </a:pPr>
+                      <a:r>
+                        <a:t>4</a:t>
+                      </a:r>
+                    </a:p>
+                  </a:txBody>
+                  <a:tcPr/>
+                </a:tc>
+                <a:tc>
+                  <a:txBody>
+                    <a:bodyPr/>
+                    <a:lstStyle/>
+                    <a:p>
+                      <a:pPr>
+                        <a:defRPr sz="1200"/>
+                      </a:pPr>
+                      <a:r>
+                        <a:t>$70000/yr</a:t>
+                      </a:r>
+                    </a:p>
+                  </a:txBody>
+                  <a:tcPr/>
+                </a:tc>
+                <a:tc>
+                  <a:txBody>
+                    <a:bodyPr/>
+                    <a:lstStyle/>
+                    <a:p>
+                      <a:pPr>
+                        <a:defRPr sz="1200"/>
+                      </a:pPr>
+                      <a:r>
+                        <a:t>160</a:t>
+                      </a:r>
+                    </a:p>
+                  </a:txBody>
+                  <a:tcPr/>
+                </a:tc>
+              </a:tr>
+              <a:tr h="609600">
+                <a:tc>
+                  <a:txBody>
+                    <a:bodyPr/>
+                    <a:lstStyle/>
+                    <a:p>
+                      <a:pPr>
+                        <a:defRPr sz="1200"/>
+                      </a:pPr>
+                      <a:r>
+                        <a:t>Field Engineer</a:t>
+                      </a:r>
+                    </a:p>
+                  </a:txBody>
+                  <a:tcPr/>
+                </a:tc>
+                <a:tc>
+                  <a:txBody>
+                    <a:bodyPr/>
+                    <a:lstStyle/>
+                    <a:p>
+                      <a:pPr>
+                        <a:defRPr sz="1200"/>
+                      </a:pPr>
+                      <a:r>
+                        <a:t>3</a:t>
+                      </a:r>
+                    </a:p>
+                  </a:txBody>
+                  <a:tcPr/>
+                </a:tc>
+                <a:tc>
+                  <a:txBody>
+                    <a:bodyPr/>
+                    <a:lstStyle/>
+                    <a:p>
+                      <a:pPr>
+                        <a:defRPr sz="1200"/>
+                      </a:pPr>
+                      <a:r>
+                        <a:t>$65000/yr</a:t>
+                      </a:r>
+                    </a:p>
+                  </a:txBody>
+                  <a:tcPr/>
+                </a:tc>
+                <a:tc>
+                  <a:txBody>
+                    <a:bodyPr/>
+                    <a:lstStyle/>
+                    <a:p>
+                      <a:pPr>
+                        <a:defRPr sz="1200"/>
+                      </a:pPr>
+                      <a:r>
+                        <a:t>160</a:t>
+                      </a:r>
+                    </a:p>
+                  </a:txBody>
+                  <a:tcPr/>
+                </a:tc>
+              </a:tr>
+              <a:tr h="609600">
+                <a:tc>
+                  <a:txBody>
+                    <a:bodyPr/>
+                    <a:lstStyle/>
+                    <a:p>
+                      <a:pPr>
+                        <a:defRPr sz="1200"/>
+                      </a:pPr>
+                      <a:r>
+                        <a:t>Building Technician</a:t>
+                      </a:r>
+                    </a:p>
+                  </a:txBody>
+                  <a:tcPr/>
+                </a:tc>
+                <a:tc>
+                  <a:txBody>
+                    <a:bodyPr/>
+                    <a:lstStyle/>
+                    <a:p>
+                      <a:pPr>
+                        <a:defRPr sz="1200"/>
+                      </a:pPr>
+                      <a:r>
+                        <a:t>10</a:t>
+                      </a:r>
+                    </a:p>
+                  </a:txBody>
+                  <a:tcPr/>
+                </a:tc>
+                <a:tc>
+                  <a:txBody>
+                    <a:bodyPr/>
+                    <a:lstStyle/>
+                    <a:p>
+                      <a:pPr>
+                        <a:defRPr sz="1200"/>
+                      </a:pPr>
+                      <a:r>
+                        <a:t>$55000/yr</a:t>
+                      </a:r>
+                    </a:p>
+                  </a:txBody>
+                  <a:tcPr/>
+                </a:tc>
+                <a:tc>
+                  <a:txBody>
+                    <a:bodyPr/>
+                    <a:lstStyle/>
+                    <a:p>
+                      <a:pPr>
+                        <a:defRPr sz="1200"/>
+                      </a:pPr>
+                      <a:r>
+                        <a:t>160</a:t>
+                      </a:r>
+                    </a:p>
+                  </a:txBody>
+                  <a:tcPr/>
+                </a:tc>
+              </a:tr>
+            </a:tbl>
+          </a:graphicData>
+        </a:graphic>
+      </p:graphicFrame>
+    </p:spTree>
+  </p:cSld>
+  <p:clrMapOvr>
+    <a:masterClrMapping/>
+  </p:clrMapOvr>
+</p:sld>
+</file>
+
+<file path=ppt/slides/slide5.xml><?xml version="1.0" encoding="utf-8"?>
+<p:sld xmlns:a="http://schemas.openxmlformats.org/drawingml/2006/main" xmlns:p="http://schemas.openxmlformats.org/presentationml/2006/main" xmlns:r="http://schemas.openxmlformats.org/officeDocument/2006/relationships">
+  <p:cSld>
+    <p:spTree>
+      <p:nvGrpSpPr>
+        <p:cNvPr id="1" name=""/>
+        <p:cNvGrpSpPr/>
+        <p:nvPr/>
+      </p:nvGrpSpPr>
+      <p:grpSpPr/>
+      <p:sp>
+        <p:nvSpPr>
+          <p:cNvPr id="2" name="Title 1"/>
+          <p:cNvSpPr>
+            <a:spLocks noGrp="1"/>
+          </p:cNvSpPr>
+          <p:nvPr>
+            <p:ph type="title"/>
           </p:nvPr>
         </p:nvSpPr>
         <p:spPr/>
         <p:txBody>
           <a:bodyPr/>
           <a:lstStyle/>
-          <a:p/>
-          <a:p>
-            <a:r>
-              <a:rPr sz="1800"/>
-              <a:t>Trucks and Equipment: $250000 (Purchased 2015, 7 year depreciation)</a:t>
-            </a:r>
-          </a:p>
-          <a:p>
-            <a:r>
-              <a:rPr sz="1800"/>
-              <a:t>Tools and Equipment: $239000 (Purchased 2016, 5 year depreciation)</a:t>
-            </a:r>
-          </a:p>
-          <a:p>
-            <a:r>
-              <a:rPr sz="1800"/>
-              <a:t>Leasehold Improvements: $175000 (Purchased 2017, 10 year depreciation)</a:t>
-            </a:r>
-          </a:p>
-          <a:p>
-            <a:r>
-              <a:rPr sz="1800"/>
-              <a:t>Technology Upgrade: $192000 (Purchased 2018, 4 year depreciation)</a:t>
-            </a:r>
-          </a:p>
-          <a:p>
-            <a:r>
-              <a:rPr sz="1800"/>
-              <a:t>Construction Equipment: $211000 (Purchased 2019, 6 year depreciation)</a:t>
-            </a:r>
-          </a:p>
-        </p:txBody>
-      </p:sp>
+          <a:p>
+            <a:r>
+              <a:t>Operating Expenses</a:t>
+            </a:r>
+          </a:p>
+        </p:txBody>
+      </p:sp>
+      <p:graphicFrame>
+        <p:nvGraphicFramePr>
+          <p:cNvPr id="3" name="Table 2"/>
+          <p:cNvGraphicFramePr>
+            <a:graphicFrameLocks noGrp="1"/>
+          </p:cNvGraphicFramePr>
+          <p:nvPr/>
+        </p:nvGraphicFramePr>
+        <p:xfrm>
+          <a:off x="914400" y="1371600"/>
+          <a:ext cx="7315200" cy="2743200"/>
+        </p:xfrm>
+        <a:graphic>
+          <a:graphicData uri="http://schemas.openxmlformats.org/drawingml/2006/table">
+            <a:tbl>
+              <a:tblPr firstRow="1" bandRow="1">
+                <a:tableStyleId>{5C22544A-7EE6-4342-B048-85BDC9FD1C3A}</a:tableStyleId>
+              </a:tblPr>
+              <a:tblGrid>
+                <a:gridCol w="2438400"/>
+                <a:gridCol w="2438400"/>
+                <a:gridCol w="2438400"/>
+              </a:tblGrid>
+              <a:tr h="457200">
+                <a:tc>
+                  <a:txBody>
+                    <a:bodyPr/>
+                    <a:lstStyle/>
+                    <a:p>
+                      <a:pPr>
+                        <a:defRPr b="1" sz="1400">
+                          <a:solidFill>
+                            <a:srgbClr val="FFFFFF"/>
+                          </a:solidFill>
+                        </a:defRPr>
+                      </a:pPr>
+                      <a:r>
+                        <a:t>Expense Name</a:t>
+                      </a:r>
+                    </a:p>
+                  </a:txBody>
+                  <a:tcPr/>
+                </a:tc>
+                <a:tc>
+                  <a:txBody>
+                    <a:bodyPr/>
+                    <a:lstStyle/>
+                    <a:p>
+                      <a:pPr>
+                        <a:defRPr b="1" sz="1400">
+                          <a:solidFill>
+                            <a:srgbClr val="FFFFFF"/>
+                          </a:solidFill>
+                        </a:defRPr>
+                      </a:pPr>
+                      <a:r>
+                        <a:t>Amount</a:t>
+                      </a:r>
+                    </a:p>
+                  </a:txBody>
+                  <a:tcPr/>
+                </a:tc>
+                <a:tc>
+                  <a:txBody>
+                    <a:bodyPr/>
+                    <a:lstStyle/>
+                    <a:p>
+                      <a:pPr>
+                        <a:defRPr b="1" sz="1400">
+                          <a:solidFill>
+                            <a:srgbClr val="FFFFFF"/>
+                          </a:solidFill>
+                        </a:defRPr>
+                      </a:pPr>
+                      <a:r>
+                        <a:t>Frequency</a:t>
+                      </a:r>
+                    </a:p>
+                  </a:txBody>
+                  <a:tcPr/>
+                </a:tc>
+              </a:tr>
+              <a:tr h="457200">
+                <a:tc>
+                  <a:txBody>
+                    <a:bodyPr/>
+                    <a:lstStyle/>
+                    <a:p>
+                      <a:pPr>
+                        <a:defRPr sz="1200"/>
+                      </a:pPr>
+                      <a:r>
+                        <a:t>Employee Salaries</a:t>
+                      </a:r>
+                    </a:p>
+                  </a:txBody>
+                  <a:tcPr/>
+                </a:tc>
+                <a:tc>
+                  <a:txBody>
+                    <a:bodyPr/>
+                    <a:lstStyle/>
+                    <a:p>
+                      <a:pPr>
+                        <a:defRPr sz="1200"/>
+                      </a:pPr>
+                      <a:r>
+                        <a:t>$1560000</a:t>
+                      </a:r>
+                    </a:p>
+                  </a:txBody>
+                  <a:tcPr/>
+                </a:tc>
+                <a:tc>
+                  <a:txBody>
+                    <a:bodyPr/>
+                    <a:lstStyle/>
+                    <a:p>
+                      <a:pPr>
+                        <a:defRPr sz="1200"/>
+                      </a:pPr>
+                      <a:r>
+                        <a:t>Monthly</a:t>
+                      </a:r>
+                    </a:p>
+                  </a:txBody>
+                  <a:tcPr/>
+                </a:tc>
+              </a:tr>
+              <a:tr h="457200">
+                <a:tc>
+                  <a:txBody>
+                    <a:bodyPr/>
+                    <a:lstStyle/>
+                    <a:p>
+                      <a:pPr>
+                        <a:defRPr sz="1200"/>
+                      </a:pPr>
+                      <a:r>
+                        <a:t>Office Rent</a:t>
+                      </a:r>
+                    </a:p>
+                  </a:txBody>
+                  <a:tcPr/>
+                </a:tc>
+                <a:tc>
+                  <a:txBody>
+                    <a:bodyPr/>
+                    <a:lstStyle/>
+                    <a:p>
+                      <a:pPr>
+                        <a:defRPr sz="1200"/>
+                      </a:pPr>
+                      <a:r>
+                        <a:t>$300000</a:t>
+                      </a:r>
+                    </a:p>
+                  </a:txBody>
+                  <a:tcPr/>
+                </a:tc>
+                <a:tc>
+                  <a:txBody>
+                    <a:bodyPr/>
+                    <a:lstStyle/>
+                    <a:p>
+                      <a:pPr>
+                        <a:defRPr sz="1200"/>
+                      </a:pPr>
+                      <a:r>
+                        <a:t>Annual</a:t>
+                      </a:r>
+                    </a:p>
+                  </a:txBody>
+                  <a:tcPr/>
+                </a:tc>
+              </a:tr>
+              <a:tr h="457200">
+                <a:tc>
+                  <a:txBody>
+                    <a:bodyPr/>
+                    <a:lstStyle/>
+                    <a:p>
+                      <a:pPr>
+                        <a:defRPr sz="1200"/>
+                      </a:pPr>
+                      <a:r>
+                        <a:t>Marketing &amp; Advertising</a:t>
+                      </a:r>
+                    </a:p>
+                  </a:txBody>
+                  <a:tcPr/>
+                </a:tc>
+                <a:tc>
+                  <a:txBody>
+                    <a:bodyPr/>
+                    <a:lstStyle/>
+                    <a:p>
+                      <a:pPr>
+                        <a:defRPr sz="1200"/>
+                      </a:pPr>
+                      <a:r>
+                        <a:t>$120000</a:t>
+                      </a:r>
+                    </a:p>
+                  </a:txBody>
+                  <a:tcPr/>
+                </a:tc>
+                <a:tc>
+                  <a:txBody>
+                    <a:bodyPr/>
+                    <a:lstStyle/>
+                    <a:p>
+                      <a:pPr>
+                        <a:defRPr sz="1200"/>
+                      </a:pPr>
+                      <a:r>
+                        <a:t>Annual</a:t>
+                      </a:r>
+                    </a:p>
+                  </a:txBody>
+                  <a:tcPr/>
+                </a:tc>
+              </a:tr>
+              <a:tr h="457200">
+                <a:tc>
+                  <a:txBody>
+                    <a:bodyPr/>
+                    <a:lstStyle/>
+                    <a:p>
+                      <a:pPr>
+                        <a:defRPr sz="1200"/>
+                      </a:pPr>
+                      <a:r>
+                        <a:t>Equipment Maintenance</a:t>
+                      </a:r>
+                    </a:p>
+                  </a:txBody>
+                  <a:tcPr/>
+                </a:tc>
+                <a:tc>
+                  <a:txBody>
+                    <a:bodyPr/>
+                    <a:lstStyle/>
+                    <a:p>
+                      <a:pPr>
+                        <a:defRPr sz="1200"/>
+                      </a:pPr>
+                      <a:r>
+                        <a:t>$150000</a:t>
+                      </a:r>
+                    </a:p>
+                  </a:txBody>
+                  <a:tcPr/>
+                </a:tc>
+                <a:tc>
+                  <a:txBody>
+                    <a:bodyPr/>
+                    <a:lstStyle/>
+                    <a:p>
+                      <a:pPr>
+                        <a:defRPr sz="1200"/>
+                      </a:pPr>
+                      <a:r>
+                        <a:t>Quarterly</a:t>
+                      </a:r>
+                    </a:p>
+                  </a:txBody>
+                  <a:tcPr/>
+                </a:tc>
+              </a:tr>
+              <a:tr h="457200">
+                <a:tc>
+                  <a:txBody>
+                    <a:bodyPr/>
+                    <a:lstStyle/>
+                    <a:p>
+                      <a:pPr>
+                        <a:defRPr sz="1200"/>
+                      </a:pPr>
+                      <a:r>
+                        <a:t>Insurance</a:t>
+                      </a:r>
+                    </a:p>
+                  </a:txBody>
+                  <a:tcPr/>
+                </a:tc>
+                <a:tc>
+                  <a:txBody>
+                    <a:bodyPr/>
+                    <a:lstStyle/>
+                    <a:p>
+                      <a:pPr>
+                        <a:defRPr sz="1200"/>
+                      </a:pPr>
+                      <a:r>
+                        <a:t>$180000</a:t>
+                      </a:r>
+                    </a:p>
+                  </a:txBody>
+                  <a:tcPr/>
+                </a:tc>
+                <a:tc>
+                  <a:txBody>
+                    <a:bodyPr/>
+                    <a:lstStyle/>
+                    <a:p>
+                      <a:pPr>
+                        <a:defRPr sz="1200"/>
+                      </a:pPr>
+                      <a:r>
+                        <a:t>Annual</a:t>
+                      </a:r>
+                    </a:p>
+                  </a:txBody>
+                  <a:tcPr/>
+                </a:tc>
+              </a:tr>
+            </a:tbl>
+          </a:graphicData>
+        </a:graphic>
+      </p:graphicFrame>
+    </p:spTree>
+  </p:cSld>
+  <p:clrMapOvr>
+    <a:masterClrMapping/>
+  </p:clrMapOvr>
+</p:sld>
+</file>
+
+<file path=ppt/slides/slide6.xml><?xml version="1.0" encoding="utf-8"?>
+<p:sld xmlns:a="http://schemas.openxmlformats.org/drawingml/2006/main" xmlns:p="http://schemas.openxmlformats.org/presentationml/2006/main" xmlns:r="http://schemas.openxmlformats.org/officeDocument/2006/relationships">
+  <p:cSld>
+    <p:spTree>
+      <p:nvGrpSpPr>
+        <p:cNvPr id="1" name=""/>
+        <p:cNvGrpSpPr/>
+        <p:nvPr/>
+      </p:nvGrpSpPr>
+      <p:grpSpPr/>
+      <p:sp>
+        <p:nvSpPr>
+          <p:cNvPr id="2" name="Title 1"/>
+          <p:cNvSpPr>
+            <a:spLocks noGrp="1"/>
+          </p:cNvSpPr>
+          <p:nvPr>
+            <p:ph type="title"/>
+          </p:nvPr>
+        </p:nvSpPr>
+        <p:spPr/>
+        <p:txBody>
+          <a:bodyPr/>
+          <a:lstStyle/>
+          <a:p>
+            <a:r>
+              <a:t>Capital Expenditures</a:t>
+            </a:r>
+          </a:p>
+        </p:txBody>
+      </p:sp>
+      <p:graphicFrame>
+        <p:nvGraphicFramePr>
+          <p:cNvPr id="3" name="Table 2"/>
+          <p:cNvGraphicFramePr>
+            <a:graphicFrameLocks noGrp="1"/>
+          </p:cNvGraphicFramePr>
+          <p:nvPr/>
+        </p:nvGraphicFramePr>
+        <p:xfrm>
+          <a:off x="914400" y="1371600"/>
+          <a:ext cx="7315200" cy="2743200"/>
+        </p:xfrm>
+        <a:graphic>
+          <a:graphicData uri="http://schemas.openxmlformats.org/drawingml/2006/table">
+            <a:tbl>
+              <a:tblPr firstRow="1" bandRow="1">
+                <a:tableStyleId>{5C22544A-7EE6-4342-B048-85BDC9FD1C3A}</a:tableStyleId>
+              </a:tblPr>
+              <a:tblGrid>
+                <a:gridCol w="1828800"/>
+                <a:gridCol w="1828800"/>
+                <a:gridCol w="1828800"/>
+                <a:gridCol w="1828800"/>
+              </a:tblGrid>
+              <a:tr h="457200">
+                <a:tc>
+                  <a:txBody>
+                    <a:bodyPr/>
+                    <a:lstStyle/>
+                    <a:p>
+                      <a:pPr>
+                        <a:defRPr b="1" sz="1400">
+                          <a:solidFill>
+                            <a:srgbClr val="FFFFFF"/>
+                          </a:solidFill>
+                        </a:defRPr>
+                      </a:pPr>
+                      <a:r>
+                        <a:t>Item</a:t>
+                      </a:r>
+                    </a:p>
+                  </a:txBody>
+                  <a:tcPr/>
+                </a:tc>
+                <a:tc>
+                  <a:txBody>
+                    <a:bodyPr/>
+                    <a:lstStyle/>
+                    <a:p>
+                      <a:pPr>
+                        <a:defRPr b="1" sz="1400">
+                          <a:solidFill>
+                            <a:srgbClr val="FFFFFF"/>
+                          </a:solidFill>
+                        </a:defRPr>
+                      </a:pPr>
+                      <a:r>
+                        <a:t>Amount</a:t>
+                      </a:r>
+                    </a:p>
+                  </a:txBody>
+                  <a:tcPr/>
+                </a:tc>
+                <a:tc>
+                  <a:txBody>
+                    <a:bodyPr/>
+                    <a:lstStyle/>
+                    <a:p>
+                      <a:pPr>
+                        <a:defRPr b="1" sz="1400">
+                          <a:solidFill>
+                            <a:srgbClr val="FFFFFF"/>
+                          </a:solidFill>
+                        </a:defRPr>
+                      </a:pPr>
+                      <a:r>
+                        <a:t>Purchase Year</a:t>
+                      </a:r>
+                    </a:p>
+                  </a:txBody>
+                  <a:tcPr/>
+                </a:tc>
+                <a:tc>
+                  <a:txBody>
+                    <a:bodyPr/>
+                    <a:lstStyle/>
+                    <a:p>
+                      <a:pPr>
+                        <a:defRPr b="1" sz="1400">
+                          <a:solidFill>
+                            <a:srgbClr val="FFFFFF"/>
+                          </a:solidFill>
+                        </a:defRPr>
+                      </a:pPr>
+                      <a:r>
+                        <a:t>Depreciation Life</a:t>
+                      </a:r>
+                    </a:p>
+                  </a:txBody>
+                  <a:tcPr/>
+                </a:tc>
+              </a:tr>
+              <a:tr h="457200">
+                <a:tc>
+                  <a:txBody>
+                    <a:bodyPr/>
+                    <a:lstStyle/>
+                    <a:p>
+                      <a:pPr>
+                        <a:defRPr sz="1200"/>
+                      </a:pPr>
+                      <a:r>
+                        <a:t>Site Equipment</a:t>
+                      </a:r>
+                    </a:p>
+                  </a:txBody>
+                  <a:tcPr/>
+                </a:tc>
+                <a:tc>
+                  <a:txBody>
+                    <a:bodyPr/>
+                    <a:lstStyle/>
+                    <a:p>
+                      <a:pPr>
+                        <a:defRPr sz="1200"/>
+                      </a:pPr>
+                      <a:r>
+                        <a:t>$300000</a:t>
+                      </a:r>
+                    </a:p>
+                  </a:txBody>
+                  <a:tcPr/>
+                </a:tc>
+                <a:tc>
+                  <a:txBody>
+                    <a:bodyPr/>
+                    <a:lstStyle/>
+                    <a:p>
+                      <a:pPr>
+                        <a:defRPr sz="1200"/>
+                      </a:pPr>
+                      <a:r>
+                        <a:t>2024</a:t>
+                      </a:r>
+                    </a:p>
+                  </a:txBody>
+                  <a:tcPr/>
+                </a:tc>
+                <a:tc>
+                  <a:txBody>
+                    <a:bodyPr/>
+                    <a:lstStyle/>
+                    <a:p>
+                      <a:pPr>
+                        <a:defRPr sz="1200"/>
+                      </a:pPr>
+                      <a:r>
+                        <a:t>5 years</a:t>
+                      </a:r>
+                    </a:p>
+                  </a:txBody>
+                  <a:tcPr/>
+                </a:tc>
+              </a:tr>
+              <a:tr h="457200">
+                <a:tc>
+                  <a:txBody>
+                    <a:bodyPr/>
+                    <a:lstStyle/>
+                    <a:p>
+                      <a:pPr>
+                        <a:defRPr sz="1200"/>
+                      </a:pPr>
+                      <a:r>
+                        <a:t>Technology Upgrades</a:t>
+                      </a:r>
+                    </a:p>
+                  </a:txBody>
+                  <a:tcPr/>
+                </a:tc>
+                <a:tc>
+                  <a:txBody>
+                    <a:bodyPr/>
+                    <a:lstStyle/>
+                    <a:p>
+                      <a:pPr>
+                        <a:defRPr sz="1200"/>
+                      </a:pPr>
+                      <a:r>
+                        <a:t>$50000</a:t>
+                      </a:r>
+                    </a:p>
+                  </a:txBody>
+                  <a:tcPr/>
+                </a:tc>
+                <a:tc>
+                  <a:txBody>
+                    <a:bodyPr/>
+                    <a:lstStyle/>
+                    <a:p>
+                      <a:pPr>
+                        <a:defRPr sz="1200"/>
+                      </a:pPr>
+                      <a:r>
+                        <a:t>2025</a:t>
+                      </a:r>
+                    </a:p>
+                  </a:txBody>
+                  <a:tcPr/>
+                </a:tc>
+                <a:tc>
+                  <a:txBody>
+                    <a:bodyPr/>
+                    <a:lstStyle/>
+                    <a:p>
+                      <a:pPr>
+                        <a:defRPr sz="1200"/>
+                      </a:pPr>
+                      <a:r>
+                        <a:t>3 years</a:t>
+                      </a:r>
+                    </a:p>
+                  </a:txBody>
+                  <a:tcPr/>
+                </a:tc>
+              </a:tr>
+              <a:tr h="457200">
+                <a:tc>
+                  <a:txBody>
+                    <a:bodyPr/>
+                    <a:lstStyle/>
+                    <a:p>
+                      <a:pPr>
+                        <a:defRPr sz="1200"/>
+                      </a:pPr>
+                      <a:r>
+                        <a:t>New Office Building</a:t>
+                      </a:r>
+                    </a:p>
+                  </a:txBody>
+                  <a:tcPr/>
+                </a:tc>
+                <a:tc>
+                  <a:txBody>
+                    <a:bodyPr/>
+                    <a:lstStyle/>
+                    <a:p>
+                      <a:pPr>
+                        <a:defRPr sz="1200"/>
+                      </a:pPr>
+                      <a:r>
+                        <a:t>$750000</a:t>
+                      </a:r>
+                    </a:p>
+                  </a:txBody>
+                  <a:tcPr/>
+                </a:tc>
+                <a:tc>
+                  <a:txBody>
+                    <a:bodyPr/>
+                    <a:lstStyle/>
+                    <a:p>
+                      <a:pPr>
+                        <a:defRPr sz="1200"/>
+                      </a:pPr>
+                      <a:r>
+                        <a:t>2026</a:t>
+                      </a:r>
+                    </a:p>
+                  </a:txBody>
+                  <a:tcPr/>
+                </a:tc>
+                <a:tc>
+                  <a:txBody>
+                    <a:bodyPr/>
+                    <a:lstStyle/>
+                    <a:p>
+                      <a:pPr>
+                        <a:defRPr sz="1200"/>
+                      </a:pPr>
+                      <a:r>
+                        <a:t>10 years</a:t>
+                      </a:r>
+                    </a:p>
+                  </a:txBody>
+                  <a:tcPr/>
+                </a:tc>
+              </a:tr>
+              <a:tr h="457200">
+                <a:tc>
+                  <a:txBody>
+                    <a:bodyPr/>
+                    <a:lstStyle/>
+                    <a:p>
+                      <a:pPr>
+                        <a:defRPr sz="1200"/>
+                      </a:pPr>
+                      <a:r>
+                        <a:t>Vehicle Fleet Expansion</a:t>
+                      </a:r>
+                    </a:p>
+                  </a:txBody>
+                  <a:tcPr/>
+                </a:tc>
+                <a:tc>
+                  <a:txBody>
+                    <a:bodyPr/>
+                    <a:lstStyle/>
+                    <a:p>
+                      <a:pPr>
+                        <a:defRPr sz="1200"/>
+                      </a:pPr>
+                      <a:r>
+                        <a:t>$200000</a:t>
+                      </a:r>
+                    </a:p>
+                  </a:txBody>
+                  <a:tcPr/>
+                </a:tc>
+                <a:tc>
+                  <a:txBody>
+                    <a:bodyPr/>
+                    <a:lstStyle/>
+                    <a:p>
+                      <a:pPr>
+                        <a:defRPr sz="1200"/>
+                      </a:pPr>
+                      <a:r>
+                        <a:t>2024</a:t>
+                      </a:r>
+                    </a:p>
+                  </a:txBody>
+                  <a:tcPr/>
+                </a:tc>
+                <a:tc>
+                  <a:txBody>
+                    <a:bodyPr/>
+                    <a:lstStyle/>
+                    <a:p>
+                      <a:pPr>
+                        <a:defRPr sz="1200"/>
+                      </a:pPr>
+                      <a:r>
+                        <a:t>7 years</a:t>
+                      </a:r>
+                    </a:p>
+                  </a:txBody>
+                  <a:tcPr/>
+                </a:tc>
+              </a:tr>
+              <a:tr h="457200">
+                <a:tc>
+                  <a:txBody>
+                    <a:bodyPr/>
+                    <a:lstStyle/>
+                    <a:p>
+                      <a:pPr>
+                        <a:defRPr sz="1200"/>
+                      </a:pPr>
+                      <a:r>
+                        <a:t>Safety Equipment</a:t>
+                      </a:r>
+                    </a:p>
+                  </a:txBody>
+                  <a:tcPr/>
+                </a:tc>
+                <a:tc>
+                  <a:txBody>
+                    <a:bodyPr/>
+                    <a:lstStyle/>
+                    <a:p>
+                      <a:pPr>
+                        <a:defRPr sz="1200"/>
+                      </a:pPr>
+                      <a:r>
+                        <a:t>$80000</a:t>
+                      </a:r>
+                    </a:p>
+                  </a:txBody>
+                  <a:tcPr/>
+                </a:tc>
+                <a:tc>
+                  <a:txBody>
+                    <a:bodyPr/>
+                    <a:lstStyle/>
+                    <a:p>
+                      <a:pPr>
+                        <a:defRPr sz="1200"/>
+                      </a:pPr>
+                      <a:r>
+                        <a:t>2024</a:t>
+                      </a:r>
+                    </a:p>
+                  </a:txBody>
+                  <a:tcPr/>
+                </a:tc>
+                <a:tc>
+                  <a:txBody>
+                    <a:bodyPr/>
+                    <a:lstStyle/>
+                    <a:p>
+                      <a:pPr>
+                        <a:defRPr sz="1200"/>
+                      </a:pPr>
+                      <a:r>
+                        <a:t>2 years</a:t>
+                      </a:r>
+                    </a:p>
+                  </a:txBody>
+                  <a:tcPr/>
+                </a:tc>
+              </a:tr>
+            </a:tbl>
+          </a:graphicData>
+        </a:graphic>
+      </p:graphicFrame>
     </p:spTree>
   </p:cSld>
   <p:clrMapOvr>

</xml_diff>

<commit_message>
Real Estate Powerpoint Push 12-12
</commit_message>
<xml_diff>
--- a/outputs/output_ppt.pptx
+++ b/outputs/output_ppt.pptx
@@ -3198,7 +3198,7 @@
                 <a:gridCol w="1828800"/>
                 <a:gridCol w="1828800"/>
               </a:tblGrid>
-              <a:tr h="609600">
+              <a:tr h="1219200">
                 <a:tc>
                   <a:txBody>
                     <a:bodyPr/>
@@ -3276,310 +3276,124 @@
                   <a:tcPr/>
                 </a:tc>
               </a:tr>
-              <a:tr h="609600">
-                <a:tc>
-                  <a:txBody>
-                    <a:bodyPr/>
-                    <a:lstStyle/>
-                    <a:p>
-                      <a:pPr>
-                        <a:defRPr sz="1200"/>
-                      </a:pPr>
-                      <a:r>
-                        <a:t>Infrastructure Projects</a:t>
-                      </a:r>
-                    </a:p>
-                  </a:txBody>
-                  <a:tcPr/>
-                </a:tc>
-                <a:tc>
-                  <a:txBody>
-                    <a:bodyPr/>
-                    <a:lstStyle/>
-                    <a:p>
-                      <a:pPr>
-                        <a:defRPr sz="1200"/>
-                      </a:pPr>
-                      <a:r>
-                        <a:t>$200000</a:t>
-                      </a:r>
-                    </a:p>
-                  </a:txBody>
-                  <a:tcPr/>
-                </a:tc>
-                <a:tc>
-                  <a:txBody>
-                    <a:bodyPr/>
-                    <a:lstStyle/>
-                    <a:p>
-                      <a:pPr>
-                        <a:defRPr sz="1200"/>
-                      </a:pPr>
-                      <a:r>
-                        <a:t>5</a:t>
-                      </a:r>
-                    </a:p>
-                  </a:txBody>
-                  <a:tcPr/>
-                </a:tc>
-                <a:tc>
-                  <a:txBody>
-                    <a:bodyPr/>
-                    <a:lstStyle/>
-                    <a:p>
-                      <a:pPr>
-                        <a:defRPr sz="1200"/>
-                      </a:pPr>
-                      <a:r>
-                        <a:t>Competitive analysis</a:t>
+              <a:tr h="1219200">
+                <a:tc>
+                  <a:txBody>
+                    <a:bodyPr/>
+                    <a:lstStyle/>
+                    <a:p>
+                      <a:pPr>
+                        <a:defRPr sz="1200"/>
+                      </a:pPr>
+                      <a:r>
+                        <a:t>Technical/Industrial Sales</a:t>
+                      </a:r>
+                    </a:p>
+                  </a:txBody>
+                  <a:tcPr/>
+                </a:tc>
+                <a:tc>
+                  <a:txBody>
+                    <a:bodyPr/>
+                    <a:lstStyle/>
+                    <a:p>
+                      <a:pPr>
+                        <a:defRPr sz="1200"/>
+                      </a:pPr>
+                      <a:r>
+                        <a:t>$100000</a:t>
+                      </a:r>
+                    </a:p>
+                  </a:txBody>
+                  <a:tcPr/>
+                </a:tc>
+                <a:tc>
+                  <a:txBody>
+                    <a:bodyPr/>
+                    <a:lstStyle/>
+                    <a:p>
+                      <a:pPr>
+                        <a:defRPr sz="1200"/>
+                      </a:pPr>
+                      <a:r>
+                        <a:t>30</a:t>
+                      </a:r>
+                    </a:p>
+                  </a:txBody>
+                  <a:tcPr/>
+                </a:tc>
+                <a:tc>
+                  <a:txBody>
+                    <a:bodyPr/>
+                    <a:lstStyle/>
+                    <a:p>
+                      <a:pPr>
+                        <a:defRPr sz="1200"/>
+                      </a:pPr>
+                      <a:r>
+                        <a:t>CIM - Page 34</a:t>
                       </a:r>
                     </a:p>
                   </a:txBody>
                   <a:tcPr/>
                 </a:tc>
               </a:tr>
-              <a:tr h="609600">
-                <a:tc>
-                  <a:txBody>
-                    <a:bodyPr/>
-                    <a:lstStyle/>
-                    <a:p>
-                      <a:pPr>
-                        <a:defRPr sz="1200"/>
-                      </a:pPr>
-                      <a:r>
-                        <a:t>Environmental Remediation</a:t>
-                      </a:r>
-                    </a:p>
-                  </a:txBody>
-                  <a:tcPr/>
-                </a:tc>
-                <a:tc>
-                  <a:txBody>
-                    <a:bodyPr/>
-                    <a:lstStyle/>
-                    <a:p>
-                      <a:pPr>
-                        <a:defRPr sz="1200"/>
-                      </a:pPr>
-                      <a:r>
-                        <a:t>$150000</a:t>
-                      </a:r>
-                    </a:p>
-                  </a:txBody>
-                  <a:tcPr/>
-                </a:tc>
-                <a:tc>
-                  <a:txBody>
-                    <a:bodyPr/>
-                    <a:lstStyle/>
-                    <a:p>
-                      <a:pPr>
-                        <a:defRPr sz="1200"/>
-                      </a:pPr>
-                      <a:r>
-                        <a:t>7</a:t>
-                      </a:r>
-                    </a:p>
-                  </a:txBody>
-                  <a:tcPr/>
-                </a:tc>
-                <a:tc>
-                  <a:txBody>
-                    <a:bodyPr/>
-                    <a:lstStyle/>
-                    <a:p>
-                      <a:pPr>
-                        <a:defRPr sz="1200"/>
-                      </a:pPr>
-                      <a:r>
-                        <a:t>Industry guide</a:t>
-                      </a:r>
-                    </a:p>
-                  </a:txBody>
-                  <a:tcPr/>
-                </a:tc>
-              </a:tr>
-              <a:tr h="609600">
-                <a:tc>
-                  <a:txBody>
-                    <a:bodyPr/>
-                    <a:lstStyle/>
-                    <a:p>
-                      <a:pPr>
-                        <a:defRPr sz="1200"/>
-                      </a:pPr>
-                      <a:r>
-                        <a:t>Demolition Services</a:t>
-                      </a:r>
-                    </a:p>
-                  </a:txBody>
-                  <a:tcPr/>
-                </a:tc>
-                <a:tc>
-                  <a:txBody>
-                    <a:bodyPr/>
-                    <a:lstStyle/>
-                    <a:p>
-                      <a:pPr>
-                        <a:defRPr sz="1200"/>
-                      </a:pPr>
-                      <a:r>
-                        <a:t>$75000</a:t>
-                      </a:r>
-                    </a:p>
-                  </a:txBody>
-                  <a:tcPr/>
-                </a:tc>
-                <a:tc>
-                  <a:txBody>
-                    <a:bodyPr/>
-                    <a:lstStyle/>
-                    <a:p>
-                      <a:pPr>
-                        <a:defRPr sz="1200"/>
-                      </a:pPr>
-                      <a:r>
-                        <a:t>10</a:t>
-                      </a:r>
-                    </a:p>
-                  </a:txBody>
-                  <a:tcPr/>
-                </a:tc>
-                <a:tc>
-                  <a:txBody>
-                    <a:bodyPr/>
-                    <a:lstStyle/>
-                    <a:p>
-                      <a:pPr>
-                        <a:defRPr sz="1200"/>
-                      </a:pPr>
-                      <a:r>
-                        <a:t>Project bids</a:t>
-                      </a:r>
-                    </a:p>
-                  </a:txBody>
-                  <a:tcPr/>
-                </a:tc>
-              </a:tr>
-              <a:tr h="609600">
-                <a:tc>
-                  <a:txBody>
-                    <a:bodyPr/>
-                    <a:lstStyle/>
-                    <a:p>
-                      <a:pPr>
-                        <a:defRPr sz="1200"/>
-                      </a:pPr>
-                      <a:r>
-                        <a:t>Construction Management</a:t>
-                      </a:r>
-                    </a:p>
-                  </a:txBody>
-                  <a:tcPr/>
-                </a:tc>
-                <a:tc>
-                  <a:txBody>
-                    <a:bodyPr/>
-                    <a:lstStyle/>
-                    <a:p>
-                      <a:pPr>
-                        <a:defRPr sz="1200"/>
-                      </a:pPr>
-                      <a:r>
-                        <a:t>$250000</a:t>
-                      </a:r>
-                    </a:p>
-                  </a:txBody>
-                  <a:tcPr/>
-                </a:tc>
-                <a:tc>
-                  <a:txBody>
-                    <a:bodyPr/>
-                    <a:lstStyle/>
-                    <a:p>
-                      <a:pPr>
-                        <a:defRPr sz="1200"/>
-                      </a:pPr>
-                      <a:r>
-                        <a:t>3</a:t>
-                      </a:r>
-                    </a:p>
-                  </a:txBody>
-                  <a:tcPr/>
-                </a:tc>
-                <a:tc>
-                  <a:txBody>
-                    <a:bodyPr/>
-                    <a:lstStyle/>
-                    <a:p>
-                      <a:pPr>
-                        <a:defRPr sz="1200"/>
-                      </a:pPr>
-                      <a:r>
-                        <a:t>Contractor benchmark</a:t>
-                      </a:r>
-                    </a:p>
-                  </a:txBody>
-                  <a:tcPr/>
-                </a:tc>
-              </a:tr>
-              <a:tr h="609600">
-                <a:tc>
-                  <a:txBody>
-                    <a:bodyPr/>
-                    <a:lstStyle/>
-                    <a:p>
-                      <a:pPr>
-                        <a:defRPr sz="1200"/>
-                      </a:pPr>
-                      <a:r>
-                        <a:t>Civil Engineering Consultancy</a:t>
-                      </a:r>
-                    </a:p>
-                  </a:txBody>
-                  <a:tcPr/>
-                </a:tc>
-                <a:tc>
-                  <a:txBody>
-                    <a:bodyPr/>
-                    <a:lstStyle/>
-                    <a:p>
-                      <a:pPr>
-                        <a:defRPr sz="1200"/>
-                      </a:pPr>
-                      <a:r>
-                        <a:t>$100000</a:t>
-                      </a:r>
-                    </a:p>
-                  </a:txBody>
-                  <a:tcPr/>
-                </a:tc>
-                <a:tc>
-                  <a:txBody>
-                    <a:bodyPr/>
-                    <a:lstStyle/>
-                    <a:p>
-                      <a:pPr>
-                        <a:defRPr sz="1200"/>
-                      </a:pPr>
-                      <a:r>
-                        <a:t>8</a:t>
-                      </a:r>
-                    </a:p>
-                  </a:txBody>
-                  <a:tcPr/>
-                </a:tc>
-                <a:tc>
-                  <a:txBody>
-                    <a:bodyPr/>
-                    <a:lstStyle/>
-                    <a:p>
-                      <a:pPr>
-                        <a:defRPr sz="1200"/>
-                      </a:pPr>
-                      <a:r>
-                        <a:t>Consultation pricing document</a:t>
+              <a:tr h="1219200">
+                <a:tc>
+                  <a:txBody>
+                    <a:bodyPr/>
+                    <a:lstStyle/>
+                    <a:p>
+                      <a:pPr>
+                        <a:defRPr sz="1200"/>
+                      </a:pPr>
+                      <a:r>
+                        <a:t>Medical Supplies</a:t>
+                      </a:r>
+                    </a:p>
+                  </a:txBody>
+                  <a:tcPr/>
+                </a:tc>
+                <a:tc>
+                  <a:txBody>
+                    <a:bodyPr/>
+                    <a:lstStyle/>
+                    <a:p>
+                      <a:pPr>
+                        <a:defRPr sz="1200"/>
+                      </a:pPr>
+                      <a:r>
+                        <a:t>$50000</a:t>
+                      </a:r>
+                    </a:p>
+                  </a:txBody>
+                  <a:tcPr/>
+                </a:tc>
+                <a:tc>
+                  <a:txBody>
+                    <a:bodyPr/>
+                    <a:lstStyle/>
+                    <a:p>
+                      <a:pPr>
+                        <a:defRPr sz="1200"/>
+                      </a:pPr>
+                      <a:r>
+                        <a:t>50</a:t>
+                      </a:r>
+                    </a:p>
+                  </a:txBody>
+                  <a:tcPr/>
+                </a:tc>
+                <a:tc>
+                  <a:txBody>
+                    <a:bodyPr/>
+                    <a:lstStyle/>
+                    <a:p>
+                      <a:pPr>
+                        <a:defRPr sz="1200"/>
+                      </a:pPr>
+                      <a:r>
+                        <a:t>CIM - Page 34</a:t>
                       </a:r>
                     </a:p>
                   </a:txBody>
@@ -3653,7 +3467,7 @@
                 <a:gridCol w="1828800"/>
                 <a:gridCol w="1828800"/>
               </a:tblGrid>
-              <a:tr h="609600">
+              <a:tr h="1219200">
                 <a:tc>
                   <a:txBody>
                     <a:bodyPr/>
@@ -3731,310 +3545,124 @@
                   <a:tcPr/>
                 </a:tc>
               </a:tr>
-              <a:tr h="609600">
-                <a:tc>
-                  <a:txBody>
-                    <a:bodyPr/>
-                    <a:lstStyle/>
-                    <a:p>
-                      <a:pPr>
-                        <a:defRPr sz="1200"/>
-                      </a:pPr>
-                      <a:r>
-                        <a:t>Subcontractor Services</a:t>
-                      </a:r>
-                    </a:p>
-                  </a:txBody>
-                  <a:tcPr/>
-                </a:tc>
-                <a:tc>
-                  <a:txBody>
-                    <a:bodyPr/>
-                    <a:lstStyle/>
-                    <a:p>
-                      <a:pPr>
-                        <a:defRPr sz="1200"/>
-                      </a:pPr>
-                      <a:r>
-                        <a:t>$15000</a:t>
-                      </a:r>
-                    </a:p>
-                  </a:txBody>
-                  <a:tcPr/>
-                </a:tc>
-                <a:tc>
-                  <a:txBody>
-                    <a:bodyPr/>
-                    <a:lstStyle/>
-                    <a:p>
-                      <a:pPr>
-                        <a:defRPr sz="1200"/>
-                      </a:pPr>
-                      <a:r>
-                        <a:t>30</a:t>
-                      </a:r>
-                    </a:p>
-                  </a:txBody>
-                  <a:tcPr/>
-                </a:tc>
-                <a:tc>
-                  <a:txBody>
-                    <a:bodyPr/>
-                    <a:lstStyle/>
-                    <a:p>
-                      <a:pPr>
-                        <a:defRPr sz="1200"/>
-                      </a:pPr>
-                      <a:r>
-                        <a:t>Industry standard</a:t>
+              <a:tr h="1219200">
+                <a:tc>
+                  <a:txBody>
+                    <a:bodyPr/>
+                    <a:lstStyle/>
+                    <a:p>
+                      <a:pPr>
+                        <a:defRPr sz="1200"/>
+                      </a:pPr>
+                      <a:r>
+                        <a:t>Material Costs</a:t>
+                      </a:r>
+                    </a:p>
+                  </a:txBody>
+                  <a:tcPr/>
+                </a:tc>
+                <a:tc>
+                  <a:txBody>
+                    <a:bodyPr/>
+                    <a:lstStyle/>
+                    <a:p>
+                      <a:pPr>
+                        <a:defRPr sz="1200"/>
+                      </a:pPr>
+                      <a:r>
+                        <a:t>$5000</a:t>
+                      </a:r>
+                    </a:p>
+                  </a:txBody>
+                  <a:tcPr/>
+                </a:tc>
+                <a:tc>
+                  <a:txBody>
+                    <a:bodyPr/>
+                    <a:lstStyle/>
+                    <a:p>
+                      <a:pPr>
+                        <a:defRPr sz="1200"/>
+                      </a:pPr>
+                      <a:r>
+                        <a:t>220</a:t>
+                      </a:r>
+                    </a:p>
+                  </a:txBody>
+                  <a:tcPr/>
+                </a:tc>
+                <a:tc>
+                  <a:txBody>
+                    <a:bodyPr/>
+                    <a:lstStyle/>
+                    <a:p>
+                      <a:pPr>
+                        <a:defRPr sz="1200"/>
+                      </a:pPr>
+                      <a:r>
+                        <a:t>CIM - Page 34</a:t>
                       </a:r>
                     </a:p>
                   </a:txBody>
                   <a:tcPr/>
                 </a:tc>
               </a:tr>
-              <a:tr h="609600">
-                <a:tc>
-                  <a:txBody>
-                    <a:bodyPr/>
-                    <a:lstStyle/>
-                    <a:p>
-                      <a:pPr>
-                        <a:defRPr sz="1200"/>
-                      </a:pPr>
-                      <a:r>
-                        <a:t>Construction Materials</a:t>
-                      </a:r>
-                    </a:p>
-                  </a:txBody>
-                  <a:tcPr/>
-                </a:tc>
-                <a:tc>
-                  <a:txBody>
-                    <a:bodyPr/>
-                    <a:lstStyle/>
-                    <a:p>
-                      <a:pPr>
-                        <a:defRPr sz="1200"/>
-                      </a:pPr>
-                      <a:r>
-                        <a:t>$5000</a:t>
-                      </a:r>
-                    </a:p>
-                  </a:txBody>
-                  <a:tcPr/>
-                </a:tc>
-                <a:tc>
-                  <a:txBody>
-                    <a:bodyPr/>
-                    <a:lstStyle/>
-                    <a:p>
-                      <a:pPr>
-                        <a:defRPr sz="1200"/>
-                      </a:pPr>
-                      <a:r>
-                        <a:t>120</a:t>
-                      </a:r>
-                    </a:p>
-                  </a:txBody>
-                  <a:tcPr/>
-                </a:tc>
-                <a:tc>
-                  <a:txBody>
-                    <a:bodyPr/>
-                    <a:lstStyle/>
-                    <a:p>
-                      <a:pPr>
-                        <a:defRPr sz="1200"/>
-                      </a:pPr>
-                      <a:r>
-                        <a:t>Vendor list pricing</a:t>
-                      </a:r>
-                    </a:p>
-                  </a:txBody>
-                  <a:tcPr/>
-                </a:tc>
-              </a:tr>
-              <a:tr h="609600">
-                <a:tc>
-                  <a:txBody>
-                    <a:bodyPr/>
-                    <a:lstStyle/>
-                    <a:p>
-                      <a:pPr>
-                        <a:defRPr sz="1200"/>
-                      </a:pPr>
-                      <a:r>
-                        <a:t>Equipment Rentals</a:t>
-                      </a:r>
-                    </a:p>
-                  </a:txBody>
-                  <a:tcPr/>
-                </a:tc>
-                <a:tc>
-                  <a:txBody>
-                    <a:bodyPr/>
-                    <a:lstStyle/>
-                    <a:p>
-                      <a:pPr>
-                        <a:defRPr sz="1200"/>
-                      </a:pPr>
-                      <a:r>
-                        <a:t>$750</a:t>
-                      </a:r>
-                    </a:p>
-                  </a:txBody>
-                  <a:tcPr/>
-                </a:tc>
-                <a:tc>
-                  <a:txBody>
-                    <a:bodyPr/>
-                    <a:lstStyle/>
-                    <a:p>
-                      <a:pPr>
-                        <a:defRPr sz="1200"/>
-                      </a:pPr>
-                      <a:r>
-                        <a:t>50</a:t>
-                      </a:r>
-                    </a:p>
-                  </a:txBody>
-                  <a:tcPr/>
-                </a:tc>
-                <a:tc>
-                  <a:txBody>
-                    <a:bodyPr/>
-                    <a:lstStyle/>
-                    <a:p>
-                      <a:pPr>
-                        <a:defRPr sz="1200"/>
-                      </a:pPr>
-                      <a:r>
-                        <a:t>Rental company contracts</a:t>
-                      </a:r>
-                    </a:p>
-                  </a:txBody>
-                  <a:tcPr/>
-                </a:tc>
-              </a:tr>
-              <a:tr h="609600">
-                <a:tc>
-                  <a:txBody>
-                    <a:bodyPr/>
-                    <a:lstStyle/>
-                    <a:p>
-                      <a:pPr>
-                        <a:defRPr sz="1200"/>
-                      </a:pPr>
-                      <a:r>
-                        <a:t>Labor and Payroll Taxes</a:t>
-                      </a:r>
-                    </a:p>
-                  </a:txBody>
-                  <a:tcPr/>
-                </a:tc>
-                <a:tc>
-                  <a:txBody>
-                    <a:bodyPr/>
-                    <a:lstStyle/>
-                    <a:p>
-                      <a:pPr>
-                        <a:defRPr sz="1200"/>
-                      </a:pPr>
-                      <a:r>
-                        <a:t>$20000</a:t>
-                      </a:r>
-                    </a:p>
-                  </a:txBody>
-                  <a:tcPr/>
-                </a:tc>
-                <a:tc>
-                  <a:txBody>
-                    <a:bodyPr/>
-                    <a:lstStyle/>
-                    <a:p>
-                      <a:pPr>
-                        <a:defRPr sz="1200"/>
-                      </a:pPr>
-                      <a:r>
-                        <a:t>42</a:t>
-                      </a:r>
-                    </a:p>
-                  </a:txBody>
-                  <a:tcPr/>
-                </a:tc>
-                <a:tc>
-                  <a:txBody>
-                    <a:bodyPr/>
-                    <a:lstStyle/>
-                    <a:p>
-                      <a:pPr>
-                        <a:defRPr sz="1200"/>
-                      </a:pPr>
-                      <a:r>
-                        <a:t>HR compensation survey</a:t>
-                      </a:r>
-                    </a:p>
-                  </a:txBody>
-                  <a:tcPr/>
-                </a:tc>
-              </a:tr>
-              <a:tr h="609600">
-                <a:tc>
-                  <a:txBody>
-                    <a:bodyPr/>
-                    <a:lstStyle/>
-                    <a:p>
-                      <a:pPr>
-                        <a:defRPr sz="1200"/>
-                      </a:pPr>
-                      <a:r>
-                        <a:t>Transportation and Disposal Fees</a:t>
-                      </a:r>
-                    </a:p>
-                  </a:txBody>
-                  <a:tcPr/>
-                </a:tc>
-                <a:tc>
-                  <a:txBody>
-                    <a:bodyPr/>
-                    <a:lstStyle/>
-                    <a:p>
-                      <a:pPr>
-                        <a:defRPr sz="1200"/>
-                      </a:pPr>
-                      <a:r>
-                        <a:t>$3000</a:t>
-                      </a:r>
-                    </a:p>
-                  </a:txBody>
-                  <a:tcPr/>
-                </a:tc>
-                <a:tc>
-                  <a:txBody>
-                    <a:bodyPr/>
-                    <a:lstStyle/>
-                    <a:p>
-                      <a:pPr>
-                        <a:defRPr sz="1200"/>
-                      </a:pPr>
-                      <a:r>
-                        <a:t>35</a:t>
-                      </a:r>
-                    </a:p>
-                  </a:txBody>
-                  <a:tcPr/>
-                </a:tc>
-                <a:tc>
-                  <a:txBody>
-                    <a:bodyPr/>
-                    <a:lstStyle/>
-                    <a:p>
-                      <a:pPr>
-                        <a:defRPr sz="1200"/>
-                      </a:pPr>
-                      <a:r>
-                        <a:t>Logistics contract</a:t>
+              <a:tr h="1219200">
+                <a:tc>
+                  <a:txBody>
+                    <a:bodyPr/>
+                    <a:lstStyle/>
+                    <a:p>
+                      <a:pPr>
+                        <a:defRPr sz="1200"/>
+                      </a:pPr>
+                      <a:r>
+                        <a:t>Production Overheads</a:t>
+                      </a:r>
+                    </a:p>
+                  </a:txBody>
+                  <a:tcPr/>
+                </a:tc>
+                <a:tc>
+                  <a:txBody>
+                    <a:bodyPr/>
+                    <a:lstStyle/>
+                    <a:p>
+                      <a:pPr>
+                        <a:defRPr sz="1200"/>
+                      </a:pPr>
+                      <a:r>
+                        <a:t>$8000</a:t>
+                      </a:r>
+                    </a:p>
+                  </a:txBody>
+                  <a:tcPr/>
+                </a:tc>
+                <a:tc>
+                  <a:txBody>
+                    <a:bodyPr/>
+                    <a:lstStyle/>
+                    <a:p>
+                      <a:pPr>
+                        <a:defRPr sz="1200"/>
+                      </a:pPr>
+                      <a:r>
+                        <a:t>200</a:t>
+                      </a:r>
+                    </a:p>
+                  </a:txBody>
+                  <a:tcPr/>
+                </a:tc>
+                <a:tc>
+                  <a:txBody>
+                    <a:bodyPr/>
+                    <a:lstStyle/>
+                    <a:p>
+                      <a:pPr>
+                        <a:defRPr sz="1200"/>
+                      </a:pPr>
+                      <a:r>
+                        <a:t>CIM - Page 34</a:t>
                       </a:r>
                     </a:p>
                   </a:txBody>
@@ -4108,7 +3736,7 @@
                 <a:gridCol w="1828800"/>
                 <a:gridCol w="1828800"/>
               </a:tblGrid>
-              <a:tr h="609600">
+              <a:tr h="406400">
                 <a:tc>
                   <a:txBody>
                     <a:bodyPr/>
@@ -4186,47 +3814,47 @@
                   <a:tcPr/>
                 </a:tc>
               </a:tr>
-              <a:tr h="609600">
-                <a:tc>
-                  <a:txBody>
-                    <a:bodyPr/>
-                    <a:lstStyle/>
-                    <a:p>
-                      <a:pPr>
-                        <a:defRPr sz="1200"/>
-                      </a:pPr>
-                      <a:r>
-                        <a:t>Project Manager</a:t>
-                      </a:r>
-                    </a:p>
-                  </a:txBody>
-                  <a:tcPr/>
-                </a:tc>
-                <a:tc>
-                  <a:txBody>
-                    <a:bodyPr/>
-                    <a:lstStyle/>
-                    <a:p>
-                      <a:pPr>
-                        <a:defRPr sz="1200"/>
-                      </a:pPr>
-                      <a:r>
-                        <a:t>6</a:t>
-                      </a:r>
-                    </a:p>
-                  </a:txBody>
-                  <a:tcPr/>
-                </a:tc>
-                <a:tc>
-                  <a:txBody>
-                    <a:bodyPr/>
-                    <a:lstStyle/>
-                    <a:p>
-                      <a:pPr>
-                        <a:defRPr sz="1200"/>
-                      </a:pPr>
-                      <a:r>
-                        <a:t>$105000/yr</a:t>
+              <a:tr h="406400">
+                <a:tc>
+                  <a:txBody>
+                    <a:bodyPr/>
+                    <a:lstStyle/>
+                    <a:p>
+                      <a:pPr>
+                        <a:defRPr sz="1200"/>
+                      </a:pPr>
+                      <a:r>
+                        <a:t>Vice President Customer Relations</a:t>
+                      </a:r>
+                    </a:p>
+                  </a:txBody>
+                  <a:tcPr/>
+                </a:tc>
+                <a:tc>
+                  <a:txBody>
+                    <a:bodyPr/>
+                    <a:lstStyle/>
+                    <a:p>
+                      <a:pPr>
+                        <a:defRPr sz="1200"/>
+                      </a:pPr>
+                      <a:r>
+                        <a:t>1</a:t>
+                      </a:r>
+                    </a:p>
+                  </a:txBody>
+                  <a:tcPr/>
+                </a:tc>
+                <a:tc>
+                  <a:txBody>
+                    <a:bodyPr/>
+                    <a:lstStyle/>
+                    <a:p>
+                      <a:pPr>
+                        <a:defRPr sz="1200"/>
+                      </a:pPr>
+                      <a:r>
+                        <a:t>$150000/yr</a:t>
                       </a:r>
                     </a:p>
                   </a:txBody>
@@ -4248,32 +3876,280 @@
                   <a:tcPr/>
                 </a:tc>
               </a:tr>
-              <a:tr h="609600">
-                <a:tc>
-                  <a:txBody>
-                    <a:bodyPr/>
-                    <a:lstStyle/>
-                    <a:p>
-                      <a:pPr>
-                        <a:defRPr sz="1200"/>
-                      </a:pPr>
-                      <a:r>
-                        <a:t>Site Superintendent</a:t>
-                      </a:r>
-                    </a:p>
-                  </a:txBody>
-                  <a:tcPr/>
-                </a:tc>
-                <a:tc>
-                  <a:txBody>
-                    <a:bodyPr/>
-                    <a:lstStyle/>
-                    <a:p>
-                      <a:pPr>
-                        <a:defRPr sz="1200"/>
-                      </a:pPr>
-                      <a:r>
-                        <a:t>14</a:t>
+              <a:tr h="406400">
+                <a:tc>
+                  <a:txBody>
+                    <a:bodyPr/>
+                    <a:lstStyle/>
+                    <a:p>
+                      <a:pPr>
+                        <a:defRPr sz="1200"/>
+                      </a:pPr>
+                      <a:r>
+                        <a:t>Director of Research and Technology Development</a:t>
+                      </a:r>
+                    </a:p>
+                  </a:txBody>
+                  <a:tcPr/>
+                </a:tc>
+                <a:tc>
+                  <a:txBody>
+                    <a:bodyPr/>
+                    <a:lstStyle/>
+                    <a:p>
+                      <a:pPr>
+                        <a:defRPr sz="1200"/>
+                      </a:pPr>
+                      <a:r>
+                        <a:t>1</a:t>
+                      </a:r>
+                    </a:p>
+                  </a:txBody>
+                  <a:tcPr/>
+                </a:tc>
+                <a:tc>
+                  <a:txBody>
+                    <a:bodyPr/>
+                    <a:lstStyle/>
+                    <a:p>
+                      <a:pPr>
+                        <a:defRPr sz="1200"/>
+                      </a:pPr>
+                      <a:r>
+                        <a:t>$140000/yr</a:t>
+                      </a:r>
+                    </a:p>
+                  </a:txBody>
+                  <a:tcPr/>
+                </a:tc>
+                <a:tc>
+                  <a:txBody>
+                    <a:bodyPr/>
+                    <a:lstStyle/>
+                    <a:p>
+                      <a:pPr>
+                        <a:defRPr sz="1200"/>
+                      </a:pPr>
+                      <a:r>
+                        <a:t>160</a:t>
+                      </a:r>
+                    </a:p>
+                  </a:txBody>
+                  <a:tcPr/>
+                </a:tc>
+              </a:tr>
+              <a:tr h="406400">
+                <a:tc>
+                  <a:txBody>
+                    <a:bodyPr/>
+                    <a:lstStyle/>
+                    <a:p>
+                      <a:pPr>
+                        <a:defRPr sz="1200"/>
+                      </a:pPr>
+                      <a:r>
+                        <a:t>Senior Scientist</a:t>
+                      </a:r>
+                    </a:p>
+                  </a:txBody>
+                  <a:tcPr/>
+                </a:tc>
+                <a:tc>
+                  <a:txBody>
+                    <a:bodyPr/>
+                    <a:lstStyle/>
+                    <a:p>
+                      <a:pPr>
+                        <a:defRPr sz="1200"/>
+                      </a:pPr>
+                      <a:r>
+                        <a:t>1</a:t>
+                      </a:r>
+                    </a:p>
+                  </a:txBody>
+                  <a:tcPr/>
+                </a:tc>
+                <a:tc>
+                  <a:txBody>
+                    <a:bodyPr/>
+                    <a:lstStyle/>
+                    <a:p>
+                      <a:pPr>
+                        <a:defRPr sz="1200"/>
+                      </a:pPr>
+                      <a:r>
+                        <a:t>$139000/yr</a:t>
+                      </a:r>
+                    </a:p>
+                  </a:txBody>
+                  <a:tcPr/>
+                </a:tc>
+                <a:tc>
+                  <a:txBody>
+                    <a:bodyPr/>
+                    <a:lstStyle/>
+                    <a:p>
+                      <a:pPr>
+                        <a:defRPr sz="1200"/>
+                      </a:pPr>
+                      <a:r>
+                        <a:t>160</a:t>
+                      </a:r>
+                    </a:p>
+                  </a:txBody>
+                  <a:tcPr/>
+                </a:tc>
+              </a:tr>
+              <a:tr h="406400">
+                <a:tc>
+                  <a:txBody>
+                    <a:bodyPr/>
+                    <a:lstStyle/>
+                    <a:p>
+                      <a:pPr>
+                        <a:defRPr sz="1200"/>
+                      </a:pPr>
+                      <a:r>
+                        <a:t>Manufacturing Specialists</a:t>
+                      </a:r>
+                    </a:p>
+                  </a:txBody>
+                  <a:tcPr/>
+                </a:tc>
+                <a:tc>
+                  <a:txBody>
+                    <a:bodyPr/>
+                    <a:lstStyle/>
+                    <a:p>
+                      <a:pPr>
+                        <a:defRPr sz="1200"/>
+                      </a:pPr>
+                      <a:r>
+                        <a:t>47</a:t>
+                      </a:r>
+                    </a:p>
+                  </a:txBody>
+                  <a:tcPr/>
+                </a:tc>
+                <a:tc>
+                  <a:txBody>
+                    <a:bodyPr/>
+                    <a:lstStyle/>
+                    <a:p>
+                      <a:pPr>
+                        <a:defRPr sz="1200"/>
+                      </a:pPr>
+                      <a:r>
+                        <a:t>$50000/yr</a:t>
+                      </a:r>
+                    </a:p>
+                  </a:txBody>
+                  <a:tcPr/>
+                </a:tc>
+                <a:tc>
+                  <a:txBody>
+                    <a:bodyPr/>
+                    <a:lstStyle/>
+                    <a:p>
+                      <a:pPr>
+                        <a:defRPr sz="1200"/>
+                      </a:pPr>
+                      <a:r>
+                        <a:t>160</a:t>
+                      </a:r>
+                    </a:p>
+                  </a:txBody>
+                  <a:tcPr/>
+                </a:tc>
+              </a:tr>
+              <a:tr h="406400">
+                <a:tc>
+                  <a:txBody>
+                    <a:bodyPr/>
+                    <a:lstStyle/>
+                    <a:p>
+                      <a:pPr>
+                        <a:defRPr sz="1200"/>
+                      </a:pPr>
+                      <a:r>
+                        <a:t>Office Support Staff</a:t>
+                      </a:r>
+                    </a:p>
+                  </a:txBody>
+                  <a:tcPr/>
+                </a:tc>
+                <a:tc>
+                  <a:txBody>
+                    <a:bodyPr/>
+                    <a:lstStyle/>
+                    <a:p>
+                      <a:pPr>
+                        <a:defRPr sz="1200"/>
+                      </a:pPr>
+                      <a:r>
+                        <a:t>30</a:t>
+                      </a:r>
+                    </a:p>
+                  </a:txBody>
+                  <a:tcPr/>
+                </a:tc>
+                <a:tc>
+                  <a:txBody>
+                    <a:bodyPr/>
+                    <a:lstStyle/>
+                    <a:p>
+                      <a:pPr>
+                        <a:defRPr sz="1200"/>
+                      </a:pPr>
+                      <a:r>
+                        <a:t>$45000/yr</a:t>
+                      </a:r>
+                    </a:p>
+                  </a:txBody>
+                  <a:tcPr/>
+                </a:tc>
+                <a:tc>
+                  <a:txBody>
+                    <a:bodyPr/>
+                    <a:lstStyle/>
+                    <a:p>
+                      <a:pPr>
+                        <a:defRPr sz="1200"/>
+                      </a:pPr>
+                      <a:r>
+                        <a:t>160</a:t>
+                      </a:r>
+                    </a:p>
+                  </a:txBody>
+                  <a:tcPr/>
+                </a:tc>
+              </a:tr>
+              <a:tr h="406400">
+                <a:tc>
+                  <a:txBody>
+                    <a:bodyPr/>
+                    <a:lstStyle/>
+                    <a:p>
+                      <a:pPr>
+                        <a:defRPr sz="1200"/>
+                      </a:pPr>
+                      <a:r>
+                        <a:t>Quality Assurance Manager</a:t>
+                      </a:r>
+                    </a:p>
+                  </a:txBody>
+                  <a:tcPr/>
+                </a:tc>
+                <a:tc>
+                  <a:txBody>
+                    <a:bodyPr/>
+                    <a:lstStyle/>
+                    <a:p>
+                      <a:pPr>
+                        <a:defRPr sz="1200"/>
+                      </a:pPr>
+                      <a:r>
+                        <a:t>1</a:t>
                       </a:r>
                     </a:p>
                   </a:txBody>
@@ -4310,47 +4186,47 @@
                   <a:tcPr/>
                 </a:tc>
               </a:tr>
-              <a:tr h="609600">
-                <a:tc>
-                  <a:txBody>
-                    <a:bodyPr/>
-                    <a:lstStyle/>
-                    <a:p>
-                      <a:pPr>
-                        <a:defRPr sz="1200"/>
-                      </a:pPr>
-                      <a:r>
-                        <a:t>Quality Control Specialist</a:t>
-                      </a:r>
-                    </a:p>
-                  </a:txBody>
-                  <a:tcPr/>
-                </a:tc>
-                <a:tc>
-                  <a:txBody>
-                    <a:bodyPr/>
-                    <a:lstStyle/>
-                    <a:p>
-                      <a:pPr>
-                        <a:defRPr sz="1200"/>
-                      </a:pPr>
-                      <a:r>
-                        <a:t>4</a:t>
-                      </a:r>
-                    </a:p>
-                  </a:txBody>
-                  <a:tcPr/>
-                </a:tc>
-                <a:tc>
-                  <a:txBody>
-                    <a:bodyPr/>
-                    <a:lstStyle/>
-                    <a:p>
-                      <a:pPr>
-                        <a:defRPr sz="1200"/>
-                      </a:pPr>
-                      <a:r>
-                        <a:t>$70000/yr</a:t>
+              <a:tr h="406400">
+                <a:tc>
+                  <a:txBody>
+                    <a:bodyPr/>
+                    <a:lstStyle/>
+                    <a:p>
+                      <a:pPr>
+                        <a:defRPr sz="1200"/>
+                      </a:pPr>
+                      <a:r>
+                        <a:t>Plant Manager</a:t>
+                      </a:r>
+                    </a:p>
+                  </a:txBody>
+                  <a:tcPr/>
+                </a:tc>
+                <a:tc>
+                  <a:txBody>
+                    <a:bodyPr/>
+                    <a:lstStyle/>
+                    <a:p>
+                      <a:pPr>
+                        <a:defRPr sz="1200"/>
+                      </a:pPr>
+                      <a:r>
+                        <a:t>2</a:t>
+                      </a:r>
+                    </a:p>
+                  </a:txBody>
+                  <a:tcPr/>
+                </a:tc>
+                <a:tc>
+                  <a:txBody>
+                    <a:bodyPr/>
+                    <a:lstStyle/>
+                    <a:p>
+                      <a:pPr>
+                        <a:defRPr sz="1200"/>
+                      </a:pPr>
+                      <a:r>
+                        <a:t>$130000/yr</a:t>
                       </a:r>
                     </a:p>
                   </a:txBody>
@@ -4372,17 +4248,17 @@
                   <a:tcPr/>
                 </a:tc>
               </a:tr>
-              <a:tr h="609600">
-                <a:tc>
-                  <a:txBody>
-                    <a:bodyPr/>
-                    <a:lstStyle/>
-                    <a:p>
-                      <a:pPr>
-                        <a:defRPr sz="1200"/>
-                      </a:pPr>
-                      <a:r>
-                        <a:t>Field Engineer</a:t>
+              <a:tr h="406400">
+                <a:tc>
+                  <a:txBody>
+                    <a:bodyPr/>
+                    <a:lstStyle/>
+                    <a:p>
+                      <a:pPr>
+                        <a:defRPr sz="1200"/>
+                      </a:pPr>
+                      <a:r>
+                        <a:t>Research &amp; Development Technicians</a:t>
                       </a:r>
                     </a:p>
                   </a:txBody>
@@ -4413,68 +4289,6 @@
                       </a:pPr>
                       <a:r>
                         <a:t>$65000/yr</a:t>
-                      </a:r>
-                    </a:p>
-                  </a:txBody>
-                  <a:tcPr/>
-                </a:tc>
-                <a:tc>
-                  <a:txBody>
-                    <a:bodyPr/>
-                    <a:lstStyle/>
-                    <a:p>
-                      <a:pPr>
-                        <a:defRPr sz="1200"/>
-                      </a:pPr>
-                      <a:r>
-                        <a:t>160</a:t>
-                      </a:r>
-                    </a:p>
-                  </a:txBody>
-                  <a:tcPr/>
-                </a:tc>
-              </a:tr>
-              <a:tr h="609600">
-                <a:tc>
-                  <a:txBody>
-                    <a:bodyPr/>
-                    <a:lstStyle/>
-                    <a:p>
-                      <a:pPr>
-                        <a:defRPr sz="1200"/>
-                      </a:pPr>
-                      <a:r>
-                        <a:t>Building Technician</a:t>
-                      </a:r>
-                    </a:p>
-                  </a:txBody>
-                  <a:tcPr/>
-                </a:tc>
-                <a:tc>
-                  <a:txBody>
-                    <a:bodyPr/>
-                    <a:lstStyle/>
-                    <a:p>
-                      <a:pPr>
-                        <a:defRPr sz="1200"/>
-                      </a:pPr>
-                      <a:r>
-                        <a:t>10</a:t>
-                      </a:r>
-                    </a:p>
-                  </a:txBody>
-                  <a:tcPr/>
-                </a:tc>
-                <a:tc>
-                  <a:txBody>
-                    <a:bodyPr/>
-                    <a:lstStyle/>
-                    <a:p>
-                      <a:pPr>
-                        <a:defRPr sz="1200"/>
-                      </a:pPr>
-                      <a:r>
-                        <a:t>$55000/yr</a:t>
                       </a:r>
                     </a:p>
                   </a:txBody>
@@ -4562,7 +4376,7 @@
                 <a:gridCol w="2438400"/>
                 <a:gridCol w="2438400"/>
               </a:tblGrid>
-              <a:tr h="457200">
+              <a:tr h="914400">
                 <a:tc>
                   <a:txBody>
                     <a:bodyPr/>
@@ -4621,220 +4435,79 @@
                   <a:tcPr/>
                 </a:tc>
               </a:tr>
-              <a:tr h="457200">
-                <a:tc>
-                  <a:txBody>
-                    <a:bodyPr/>
-                    <a:lstStyle/>
-                    <a:p>
-                      <a:pPr>
-                        <a:defRPr sz="1200"/>
-                      </a:pPr>
-                      <a:r>
-                        <a:t>Employee Salaries</a:t>
-                      </a:r>
-                    </a:p>
-                  </a:txBody>
-                  <a:tcPr/>
-                </a:tc>
-                <a:tc>
-                  <a:txBody>
-                    <a:bodyPr/>
-                    <a:lstStyle/>
-                    <a:p>
-                      <a:pPr>
-                        <a:defRPr sz="1200"/>
-                      </a:pPr>
-                      <a:r>
-                        <a:t>$1560000</a:t>
-                      </a:r>
-                    </a:p>
-                  </a:txBody>
-                  <a:tcPr/>
-                </a:tc>
-                <a:tc>
-                  <a:txBody>
-                    <a:bodyPr/>
-                    <a:lstStyle/>
-                    <a:p>
-                      <a:pPr>
-                        <a:defRPr sz="1200"/>
-                      </a:pPr>
-                      <a:r>
-                        <a:t>Monthly</a:t>
+              <a:tr h="914400">
+                <a:tc>
+                  <a:txBody>
+                    <a:bodyPr/>
+                    <a:lstStyle/>
+                    <a:p>
+                      <a:pPr>
+                        <a:defRPr sz="1200"/>
+                      </a:pPr>
+                      <a:r>
+                        <a:t>Selling and Administrative</a:t>
+                      </a:r>
+                    </a:p>
+                  </a:txBody>
+                  <a:tcPr/>
+                </a:tc>
+                <a:tc>
+                  <a:txBody>
+                    <a:bodyPr/>
+                    <a:lstStyle/>
+                    <a:p>
+                      <a:pPr>
+                        <a:defRPr sz="1200"/>
+                      </a:pPr>
+                      <a:r>
+                        <a:t>$2591862</a:t>
+                      </a:r>
+                    </a:p>
+                  </a:txBody>
+                  <a:tcPr/>
+                </a:tc>
+                <a:tc>
+                  <a:txBody>
+                    <a:bodyPr/>
+                    <a:lstStyle/>
+                    <a:p>
+                      <a:pPr>
+                        <a:defRPr sz="1200"/>
+                      </a:pPr>
+                      <a:r>
+                        <a:t>Annual</a:t>
                       </a:r>
                     </a:p>
                   </a:txBody>
                   <a:tcPr/>
                 </a:tc>
               </a:tr>
-              <a:tr h="457200">
-                <a:tc>
-                  <a:txBody>
-                    <a:bodyPr/>
-                    <a:lstStyle/>
-                    <a:p>
-                      <a:pPr>
-                        <a:defRPr sz="1200"/>
-                      </a:pPr>
-                      <a:r>
-                        <a:t>Office Rent</a:t>
-                      </a:r>
-                    </a:p>
-                  </a:txBody>
-                  <a:tcPr/>
-                </a:tc>
-                <a:tc>
-                  <a:txBody>
-                    <a:bodyPr/>
-                    <a:lstStyle/>
-                    <a:p>
-                      <a:pPr>
-                        <a:defRPr sz="1200"/>
-                      </a:pPr>
-                      <a:r>
-                        <a:t>$300000</a:t>
-                      </a:r>
-                    </a:p>
-                  </a:txBody>
-                  <a:tcPr/>
-                </a:tc>
-                <a:tc>
-                  <a:txBody>
-                    <a:bodyPr/>
-                    <a:lstStyle/>
-                    <a:p>
-                      <a:pPr>
-                        <a:defRPr sz="1200"/>
-                      </a:pPr>
-                      <a:r>
-                        <a:t>Annual</a:t>
-                      </a:r>
-                    </a:p>
-                  </a:txBody>
-                  <a:tcPr/>
-                </a:tc>
-              </a:tr>
-              <a:tr h="457200">
-                <a:tc>
-                  <a:txBody>
-                    <a:bodyPr/>
-                    <a:lstStyle/>
-                    <a:p>
-                      <a:pPr>
-                        <a:defRPr sz="1200"/>
-                      </a:pPr>
-                      <a:r>
-                        <a:t>Marketing &amp; Advertising</a:t>
-                      </a:r>
-                    </a:p>
-                  </a:txBody>
-                  <a:tcPr/>
-                </a:tc>
-                <a:tc>
-                  <a:txBody>
-                    <a:bodyPr/>
-                    <a:lstStyle/>
-                    <a:p>
-                      <a:pPr>
-                        <a:defRPr sz="1200"/>
-                      </a:pPr>
-                      <a:r>
-                        <a:t>$120000</a:t>
-                      </a:r>
-                    </a:p>
-                  </a:txBody>
-                  <a:tcPr/>
-                </a:tc>
-                <a:tc>
-                  <a:txBody>
-                    <a:bodyPr/>
-                    <a:lstStyle/>
-                    <a:p>
-                      <a:pPr>
-                        <a:defRPr sz="1200"/>
-                      </a:pPr>
-                      <a:r>
-                        <a:t>Annual</a:t>
-                      </a:r>
-                    </a:p>
-                  </a:txBody>
-                  <a:tcPr/>
-                </a:tc>
-              </a:tr>
-              <a:tr h="457200">
-                <a:tc>
-                  <a:txBody>
-                    <a:bodyPr/>
-                    <a:lstStyle/>
-                    <a:p>
-                      <a:pPr>
-                        <a:defRPr sz="1200"/>
-                      </a:pPr>
-                      <a:r>
-                        <a:t>Equipment Maintenance</a:t>
-                      </a:r>
-                    </a:p>
-                  </a:txBody>
-                  <a:tcPr/>
-                </a:tc>
-                <a:tc>
-                  <a:txBody>
-                    <a:bodyPr/>
-                    <a:lstStyle/>
-                    <a:p>
-                      <a:pPr>
-                        <a:defRPr sz="1200"/>
-                      </a:pPr>
-                      <a:r>
-                        <a:t>$150000</a:t>
-                      </a:r>
-                    </a:p>
-                  </a:txBody>
-                  <a:tcPr/>
-                </a:tc>
-                <a:tc>
-                  <a:txBody>
-                    <a:bodyPr/>
-                    <a:lstStyle/>
-                    <a:p>
-                      <a:pPr>
-                        <a:defRPr sz="1200"/>
-                      </a:pPr>
-                      <a:r>
-                        <a:t>Quarterly</a:t>
-                      </a:r>
-                    </a:p>
-                  </a:txBody>
-                  <a:tcPr/>
-                </a:tc>
-              </a:tr>
-              <a:tr h="457200">
-                <a:tc>
-                  <a:txBody>
-                    <a:bodyPr/>
-                    <a:lstStyle/>
-                    <a:p>
-                      <a:pPr>
-                        <a:defRPr sz="1200"/>
-                      </a:pPr>
-                      <a:r>
-                        <a:t>Insurance</a:t>
-                      </a:r>
-                    </a:p>
-                  </a:txBody>
-                  <a:tcPr/>
-                </a:tc>
-                <a:tc>
-                  <a:txBody>
-                    <a:bodyPr/>
-                    <a:lstStyle/>
-                    <a:p>
-                      <a:pPr>
-                        <a:defRPr sz="1200"/>
-                      </a:pPr>
-                      <a:r>
-                        <a:t>$180000</a:t>
+              <a:tr h="914400">
+                <a:tc>
+                  <a:txBody>
+                    <a:bodyPr/>
+                    <a:lstStyle/>
+                    <a:p>
+                      <a:pPr>
+                        <a:defRPr sz="1200"/>
+                      </a:pPr>
+                      <a:r>
+                        <a:t>Depreciation</a:t>
+                      </a:r>
+                    </a:p>
+                  </a:txBody>
+                  <a:tcPr/>
+                </a:tc>
+                <a:tc>
+                  <a:txBody>
+                    <a:bodyPr/>
+                    <a:lstStyle/>
+                    <a:p>
+                      <a:pPr>
+                        <a:defRPr sz="1200"/>
+                      </a:pPr>
+                      <a:r>
+                        <a:t>$626804</a:t>
                       </a:r>
                     </a:p>
                   </a:txBody>
@@ -4923,7 +4596,7 @@
                 <a:gridCol w="1828800"/>
                 <a:gridCol w="1828800"/>
               </a:tblGrid>
-              <a:tr h="457200">
+              <a:tr h="548640">
                 <a:tc>
                   <a:txBody>
                     <a:bodyPr/>
@@ -5001,47 +4674,171 @@
                   <a:tcPr/>
                 </a:tc>
               </a:tr>
-              <a:tr h="457200">
-                <a:tc>
-                  <a:txBody>
-                    <a:bodyPr/>
-                    <a:lstStyle/>
-                    <a:p>
-                      <a:pPr>
-                        <a:defRPr sz="1200"/>
-                      </a:pPr>
-                      <a:r>
-                        <a:t>Site Equipment</a:t>
-                      </a:r>
-                    </a:p>
-                  </a:txBody>
-                  <a:tcPr/>
-                </a:tc>
-                <a:tc>
-                  <a:txBody>
-                    <a:bodyPr/>
-                    <a:lstStyle/>
-                    <a:p>
-                      <a:pPr>
-                        <a:defRPr sz="1200"/>
-                      </a:pPr>
-                      <a:r>
-                        <a:t>$300000</a:t>
-                      </a:r>
-                    </a:p>
-                  </a:txBody>
-                  <a:tcPr/>
-                </a:tc>
-                <a:tc>
-                  <a:txBody>
-                    <a:bodyPr/>
-                    <a:lstStyle/>
-                    <a:p>
-                      <a:pPr>
-                        <a:defRPr sz="1200"/>
-                      </a:pPr>
-                      <a:r>
-                        <a:t>2024</a:t>
+              <a:tr h="548640">
+                <a:tc>
+                  <a:txBody>
+                    <a:bodyPr/>
+                    <a:lstStyle/>
+                    <a:p>
+                      <a:pPr>
+                        <a:defRPr sz="1200"/>
+                      </a:pPr>
+                      <a:r>
+                        <a:t>Machinery and Equipment</a:t>
+                      </a:r>
+                    </a:p>
+                  </a:txBody>
+                  <a:tcPr/>
+                </a:tc>
+                <a:tc>
+                  <a:txBody>
+                    <a:bodyPr/>
+                    <a:lstStyle/>
+                    <a:p>
+                      <a:pPr>
+                        <a:defRPr sz="1200"/>
+                      </a:pPr>
+                      <a:r>
+                        <a:t>$425000</a:t>
+                      </a:r>
+                    </a:p>
+                  </a:txBody>
+                  <a:tcPr/>
+                </a:tc>
+                <a:tc>
+                  <a:txBody>
+                    <a:bodyPr/>
+                    <a:lstStyle/>
+                    <a:p>
+                      <a:pPr>
+                        <a:defRPr sz="1200"/>
+                      </a:pPr>
+                      <a:r>
+                        <a:t>2023</a:t>
+                      </a:r>
+                    </a:p>
+                  </a:txBody>
+                  <a:tcPr/>
+                </a:tc>
+                <a:tc>
+                  <a:txBody>
+                    <a:bodyPr/>
+                    <a:lstStyle/>
+                    <a:p>
+                      <a:pPr>
+                        <a:defRPr sz="1200"/>
+                      </a:pPr>
+                      <a:r>
+                        <a:t>10 years</a:t>
+                      </a:r>
+                    </a:p>
+                  </a:txBody>
+                  <a:tcPr/>
+                </a:tc>
+              </a:tr>
+              <a:tr h="548640">
+                <a:tc>
+                  <a:txBody>
+                    <a:bodyPr/>
+                    <a:lstStyle/>
+                    <a:p>
+                      <a:pPr>
+                        <a:defRPr sz="1200"/>
+                      </a:pPr>
+                      <a:r>
+                        <a:t>Facility Improvements</a:t>
+                      </a:r>
+                    </a:p>
+                  </a:txBody>
+                  <a:tcPr/>
+                </a:tc>
+                <a:tc>
+                  <a:txBody>
+                    <a:bodyPr/>
+                    <a:lstStyle/>
+                    <a:p>
+                      <a:pPr>
+                        <a:defRPr sz="1200"/>
+                      </a:pPr>
+                      <a:r>
+                        <a:t>$163000</a:t>
+                      </a:r>
+                    </a:p>
+                  </a:txBody>
+                  <a:tcPr/>
+                </a:tc>
+                <a:tc>
+                  <a:txBody>
+                    <a:bodyPr/>
+                    <a:lstStyle/>
+                    <a:p>
+                      <a:pPr>
+                        <a:defRPr sz="1200"/>
+                      </a:pPr>
+                      <a:r>
+                        <a:t>2023</a:t>
+                      </a:r>
+                    </a:p>
+                  </a:txBody>
+                  <a:tcPr/>
+                </a:tc>
+                <a:tc>
+                  <a:txBody>
+                    <a:bodyPr/>
+                    <a:lstStyle/>
+                    <a:p>
+                      <a:pPr>
+                        <a:defRPr sz="1200"/>
+                      </a:pPr>
+                      <a:r>
+                        <a:t>15 years</a:t>
+                      </a:r>
+                    </a:p>
+                  </a:txBody>
+                  <a:tcPr/>
+                </a:tc>
+              </a:tr>
+              <a:tr h="548640">
+                <a:tc>
+                  <a:txBody>
+                    <a:bodyPr/>
+                    <a:lstStyle/>
+                    <a:p>
+                      <a:pPr>
+                        <a:defRPr sz="1200"/>
+                      </a:pPr>
+                      <a:r>
+                        <a:t>New Computer System</a:t>
+                      </a:r>
+                    </a:p>
+                  </a:txBody>
+                  <a:tcPr/>
+                </a:tc>
+                <a:tc>
+                  <a:txBody>
+                    <a:bodyPr/>
+                    <a:lstStyle/>
+                    <a:p>
+                      <a:pPr>
+                        <a:defRPr sz="1200"/>
+                      </a:pPr>
+                      <a:r>
+                        <a:t>$1208937</a:t>
+                      </a:r>
+                    </a:p>
+                  </a:txBody>
+                  <a:tcPr/>
+                </a:tc>
+                <a:tc>
+                  <a:txBody>
+                    <a:bodyPr/>
+                    <a:lstStyle/>
+                    <a:p>
+                      <a:pPr>
+                        <a:defRPr sz="1200"/>
+                      </a:pPr>
+                      <a:r>
+                        <a:t>2015</a:t>
                       </a:r>
                     </a:p>
                   </a:txBody>
@@ -5063,248 +4860,62 @@
                   <a:tcPr/>
                 </a:tc>
               </a:tr>
-              <a:tr h="457200">
-                <a:tc>
-                  <a:txBody>
-                    <a:bodyPr/>
-                    <a:lstStyle/>
-                    <a:p>
-                      <a:pPr>
-                        <a:defRPr sz="1200"/>
-                      </a:pPr>
-                      <a:r>
-                        <a:t>Technology Upgrades</a:t>
-                      </a:r>
-                    </a:p>
-                  </a:txBody>
-                  <a:tcPr/>
-                </a:tc>
-                <a:tc>
-                  <a:txBody>
-                    <a:bodyPr/>
-                    <a:lstStyle/>
-                    <a:p>
-                      <a:pPr>
-                        <a:defRPr sz="1200"/>
-                      </a:pPr>
-                      <a:r>
-                        <a:t>$50000</a:t>
-                      </a:r>
-                    </a:p>
-                  </a:txBody>
-                  <a:tcPr/>
-                </a:tc>
-                <a:tc>
-                  <a:txBody>
-                    <a:bodyPr/>
-                    <a:lstStyle/>
-                    <a:p>
-                      <a:pPr>
-                        <a:defRPr sz="1200"/>
-                      </a:pPr>
-                      <a:r>
-                        <a:t>2025</a:t>
-                      </a:r>
-                    </a:p>
-                  </a:txBody>
-                  <a:tcPr/>
-                </a:tc>
-                <a:tc>
-                  <a:txBody>
-                    <a:bodyPr/>
-                    <a:lstStyle/>
-                    <a:p>
-                      <a:pPr>
-                        <a:defRPr sz="1200"/>
-                      </a:pPr>
-                      <a:r>
-                        <a:t>3 years</a:t>
-                      </a:r>
-                    </a:p>
-                  </a:txBody>
-                  <a:tcPr/>
-                </a:tc>
-              </a:tr>
-              <a:tr h="457200">
-                <a:tc>
-                  <a:txBody>
-                    <a:bodyPr/>
-                    <a:lstStyle/>
-                    <a:p>
-                      <a:pPr>
-                        <a:defRPr sz="1200"/>
-                      </a:pPr>
-                      <a:r>
-                        <a:t>New Office Building</a:t>
-                      </a:r>
-                    </a:p>
-                  </a:txBody>
-                  <a:tcPr/>
-                </a:tc>
-                <a:tc>
-                  <a:txBody>
-                    <a:bodyPr/>
-                    <a:lstStyle/>
-                    <a:p>
-                      <a:pPr>
-                        <a:defRPr sz="1200"/>
-                      </a:pPr>
-                      <a:r>
-                        <a:t>$750000</a:t>
-                      </a:r>
-                    </a:p>
-                  </a:txBody>
-                  <a:tcPr/>
-                </a:tc>
-                <a:tc>
-                  <a:txBody>
-                    <a:bodyPr/>
-                    <a:lstStyle/>
-                    <a:p>
-                      <a:pPr>
-                        <a:defRPr sz="1200"/>
-                      </a:pPr>
-                      <a:r>
-                        <a:t>2026</a:t>
-                      </a:r>
-                    </a:p>
-                  </a:txBody>
-                  <a:tcPr/>
-                </a:tc>
-                <a:tc>
-                  <a:txBody>
-                    <a:bodyPr/>
-                    <a:lstStyle/>
-                    <a:p>
-                      <a:pPr>
-                        <a:defRPr sz="1200"/>
-                      </a:pPr>
-                      <a:r>
-                        <a:t>10 years</a:t>
-                      </a:r>
-                    </a:p>
-                  </a:txBody>
-                  <a:tcPr/>
-                </a:tc>
-              </a:tr>
-              <a:tr h="457200">
-                <a:tc>
-                  <a:txBody>
-                    <a:bodyPr/>
-                    <a:lstStyle/>
-                    <a:p>
-                      <a:pPr>
-                        <a:defRPr sz="1200"/>
-                      </a:pPr>
-                      <a:r>
-                        <a:t>Vehicle Fleet Expansion</a:t>
-                      </a:r>
-                    </a:p>
-                  </a:txBody>
-                  <a:tcPr/>
-                </a:tc>
-                <a:tc>
-                  <a:txBody>
-                    <a:bodyPr/>
-                    <a:lstStyle/>
-                    <a:p>
-                      <a:pPr>
-                        <a:defRPr sz="1200"/>
-                      </a:pPr>
-                      <a:r>
-                        <a:t>$200000</a:t>
-                      </a:r>
-                    </a:p>
-                  </a:txBody>
-                  <a:tcPr/>
-                </a:tc>
-                <a:tc>
-                  <a:txBody>
-                    <a:bodyPr/>
-                    <a:lstStyle/>
-                    <a:p>
-                      <a:pPr>
-                        <a:defRPr sz="1200"/>
-                      </a:pPr>
-                      <a:r>
-                        <a:t>2024</a:t>
-                      </a:r>
-                    </a:p>
-                  </a:txBody>
-                  <a:tcPr/>
-                </a:tc>
-                <a:tc>
-                  <a:txBody>
-                    <a:bodyPr/>
-                    <a:lstStyle/>
-                    <a:p>
-                      <a:pPr>
-                        <a:defRPr sz="1200"/>
-                      </a:pPr>
-                      <a:r>
-                        <a:t>7 years</a:t>
-                      </a:r>
-                    </a:p>
-                  </a:txBody>
-                  <a:tcPr/>
-                </a:tc>
-              </a:tr>
-              <a:tr h="457200">
-                <a:tc>
-                  <a:txBody>
-                    <a:bodyPr/>
-                    <a:lstStyle/>
-                    <a:p>
-                      <a:pPr>
-                        <a:defRPr sz="1200"/>
-                      </a:pPr>
-                      <a:r>
-                        <a:t>Safety Equipment</a:t>
-                      </a:r>
-                    </a:p>
-                  </a:txBody>
-                  <a:tcPr/>
-                </a:tc>
-                <a:tc>
-                  <a:txBody>
-                    <a:bodyPr/>
-                    <a:lstStyle/>
-                    <a:p>
-                      <a:pPr>
-                        <a:defRPr sz="1200"/>
-                      </a:pPr>
-                      <a:r>
-                        <a:t>$80000</a:t>
-                      </a:r>
-                    </a:p>
-                  </a:txBody>
-                  <a:tcPr/>
-                </a:tc>
-                <a:tc>
-                  <a:txBody>
-                    <a:bodyPr/>
-                    <a:lstStyle/>
-                    <a:p>
-                      <a:pPr>
-                        <a:defRPr sz="1200"/>
-                      </a:pPr>
-                      <a:r>
-                        <a:t>2024</a:t>
-                      </a:r>
-                    </a:p>
-                  </a:txBody>
-                  <a:tcPr/>
-                </a:tc>
-                <a:tc>
-                  <a:txBody>
-                    <a:bodyPr/>
-                    <a:lstStyle/>
-                    <a:p>
-                      <a:pPr>
-                        <a:defRPr sz="1200"/>
-                      </a:pPr>
-                      <a:r>
-                        <a:t>2 years</a:t>
+              <a:tr h="548640">
+                <a:tc>
+                  <a:txBody>
+                    <a:bodyPr/>
+                    <a:lstStyle/>
+                    <a:p>
+                      <a:pPr>
+                        <a:defRPr sz="1200"/>
+                      </a:pPr>
+                      <a:r>
+                        <a:t>Real Estate Investments</a:t>
+                      </a:r>
+                    </a:p>
+                  </a:txBody>
+                  <a:tcPr/>
+                </a:tc>
+                <a:tc>
+                  <a:txBody>
+                    <a:bodyPr/>
+                    <a:lstStyle/>
+                    <a:p>
+                      <a:pPr>
+                        <a:defRPr sz="1200"/>
+                      </a:pPr>
+                      <a:r>
+                        <a:t>$4450000</a:t>
+                      </a:r>
+                    </a:p>
+                  </a:txBody>
+                  <a:tcPr/>
+                </a:tc>
+                <a:tc>
+                  <a:txBody>
+                    <a:bodyPr/>
+                    <a:lstStyle/>
+                    <a:p>
+                      <a:pPr>
+                        <a:defRPr sz="1200"/>
+                      </a:pPr>
+                      <a:r>
+                        <a:t>2023</a:t>
+                      </a:r>
+                    </a:p>
+                  </a:txBody>
+                  <a:tcPr/>
+                </a:tc>
+                <a:tc>
+                  <a:txBody>
+                    <a:bodyPr/>
+                    <a:lstStyle/>
+                    <a:p>
+                      <a:pPr>
+                        <a:defRPr sz="1200"/>
+                      </a:pPr>
+                      <a:r>
+                        <a:t>20 years</a:t>
                       </a:r>
                     </a:p>
                   </a:txBody>

</xml_diff>

<commit_message>
1-10-25 AI calls and xlsx output bug fixes
</commit_message>
<xml_diff>
--- a/outputs/output_ppt.pptx
+++ b/outputs/output_ppt.pptx
@@ -11,6 +11,7 @@
     <p:sldId id="259" r:id="rId10"/>
     <p:sldId id="260" r:id="rId11"/>
     <p:sldId id="261" r:id="rId12"/>
+    <p:sldId id="262" r:id="rId13"/>
   </p:sldIdLst>
   <p:sldSz cx="9144000" cy="6858000" type="screen4x3"/>
   <p:notesSz cx="6858000" cy="9144000"/>
@@ -3198,7 +3199,7 @@
                 <a:gridCol w="1828800"/>
                 <a:gridCol w="1828800"/>
               </a:tblGrid>
-              <a:tr h="1219200">
+              <a:tr h="3657600">
                 <a:tc>
                   <a:txBody>
                     <a:bodyPr/>
@@ -3216,7 +3217,11 @@
                       </a:r>
                     </a:p>
                   </a:txBody>
-                  <a:tcPr/>
+                  <a:tcPr>
+                    <a:solidFill>
+                      <a:srgbClr val="000000"/>
+                    </a:solidFill>
+                  </a:tcPr>
                 </a:tc>
                 <a:tc>
                   <a:txBody>
@@ -3235,7 +3240,11 @@
                       </a:r>
                     </a:p>
                   </a:txBody>
-                  <a:tcPr/>
+                  <a:tcPr>
+                    <a:solidFill>
+                      <a:srgbClr val="000000"/>
+                    </a:solidFill>
+                  </a:tcPr>
                 </a:tc>
                 <a:tc>
                   <a:txBody>
@@ -3254,7 +3263,11 @@
                       </a:r>
                     </a:p>
                   </a:txBody>
-                  <a:tcPr/>
+                  <a:tcPr>
+                    <a:solidFill>
+                      <a:srgbClr val="000000"/>
+                    </a:solidFill>
+                  </a:tcPr>
                 </a:tc>
                 <a:tc>
                   <a:txBody>
@@ -3273,131 +3286,11 @@
                       </a:r>
                     </a:p>
                   </a:txBody>
-                  <a:tcPr/>
-                </a:tc>
-              </a:tr>
-              <a:tr h="1219200">
-                <a:tc>
-                  <a:txBody>
-                    <a:bodyPr/>
-                    <a:lstStyle/>
-                    <a:p>
-                      <a:pPr>
-                        <a:defRPr sz="1200"/>
-                      </a:pPr>
-                      <a:r>
-                        <a:t>Technical/Industrial Sales</a:t>
-                      </a:r>
-                    </a:p>
-                  </a:txBody>
-                  <a:tcPr/>
-                </a:tc>
-                <a:tc>
-                  <a:txBody>
-                    <a:bodyPr/>
-                    <a:lstStyle/>
-                    <a:p>
-                      <a:pPr>
-                        <a:defRPr sz="1200"/>
-                      </a:pPr>
-                      <a:r>
-                        <a:t>$100000</a:t>
-                      </a:r>
-                    </a:p>
-                  </a:txBody>
-                  <a:tcPr/>
-                </a:tc>
-                <a:tc>
-                  <a:txBody>
-                    <a:bodyPr/>
-                    <a:lstStyle/>
-                    <a:p>
-                      <a:pPr>
-                        <a:defRPr sz="1200"/>
-                      </a:pPr>
-                      <a:r>
-                        <a:t>30</a:t>
-                      </a:r>
-                    </a:p>
-                  </a:txBody>
-                  <a:tcPr/>
-                </a:tc>
-                <a:tc>
-                  <a:txBody>
-                    <a:bodyPr/>
-                    <a:lstStyle/>
-                    <a:p>
-                      <a:pPr>
-                        <a:defRPr sz="1200"/>
-                      </a:pPr>
-                      <a:r>
-                        <a:t>CIM - Page 34</a:t>
-                      </a:r>
-                    </a:p>
-                  </a:txBody>
-                  <a:tcPr/>
-                </a:tc>
-              </a:tr>
-              <a:tr h="1219200">
-                <a:tc>
-                  <a:txBody>
-                    <a:bodyPr/>
-                    <a:lstStyle/>
-                    <a:p>
-                      <a:pPr>
-                        <a:defRPr sz="1200"/>
-                      </a:pPr>
-                      <a:r>
-                        <a:t>Medical Supplies</a:t>
-                      </a:r>
-                    </a:p>
-                  </a:txBody>
-                  <a:tcPr/>
-                </a:tc>
-                <a:tc>
-                  <a:txBody>
-                    <a:bodyPr/>
-                    <a:lstStyle/>
-                    <a:p>
-                      <a:pPr>
-                        <a:defRPr sz="1200"/>
-                      </a:pPr>
-                      <a:r>
-                        <a:t>$50000</a:t>
-                      </a:r>
-                    </a:p>
-                  </a:txBody>
-                  <a:tcPr/>
-                </a:tc>
-                <a:tc>
-                  <a:txBody>
-                    <a:bodyPr/>
-                    <a:lstStyle/>
-                    <a:p>
-                      <a:pPr>
-                        <a:defRPr sz="1200"/>
-                      </a:pPr>
-                      <a:r>
-                        <a:t>50</a:t>
-                      </a:r>
-                    </a:p>
-                  </a:txBody>
-                  <a:tcPr/>
-                </a:tc>
-                <a:tc>
-                  <a:txBody>
-                    <a:bodyPr/>
-                    <a:lstStyle/>
-                    <a:p>
-                      <a:pPr>
-                        <a:defRPr sz="1200"/>
-                      </a:pPr>
-                      <a:r>
-                        <a:t>CIM - Page 34</a:t>
-                      </a:r>
-                    </a:p>
-                  </a:txBody>
-                  <a:tcPr/>
+                  <a:tcPr>
+                    <a:solidFill>
+                      <a:srgbClr val="000000"/>
+                    </a:solidFill>
+                  </a:tcPr>
                 </a:tc>
               </a:tr>
             </a:tbl>
@@ -3467,7 +3360,7 @@
                 <a:gridCol w="1828800"/>
                 <a:gridCol w="1828800"/>
               </a:tblGrid>
-              <a:tr h="1219200">
+              <a:tr h="3657600">
                 <a:tc>
                   <a:txBody>
                     <a:bodyPr/>
@@ -3485,7 +3378,11 @@
                       </a:r>
                     </a:p>
                   </a:txBody>
-                  <a:tcPr/>
+                  <a:tcPr>
+                    <a:solidFill>
+                      <a:srgbClr val="000000"/>
+                    </a:solidFill>
+                  </a:tcPr>
                 </a:tc>
                 <a:tc>
                   <a:txBody>
@@ -3504,7 +3401,11 @@
                       </a:r>
                     </a:p>
                   </a:txBody>
-                  <a:tcPr/>
+                  <a:tcPr>
+                    <a:solidFill>
+                      <a:srgbClr val="000000"/>
+                    </a:solidFill>
+                  </a:tcPr>
                 </a:tc>
                 <a:tc>
                   <a:txBody>
@@ -3523,7 +3424,11 @@
                       </a:r>
                     </a:p>
                   </a:txBody>
-                  <a:tcPr/>
+                  <a:tcPr>
+                    <a:solidFill>
+                      <a:srgbClr val="000000"/>
+                    </a:solidFill>
+                  </a:tcPr>
                 </a:tc>
                 <a:tc>
                   <a:txBody>
@@ -3542,131 +3447,11 @@
                       </a:r>
                     </a:p>
                   </a:txBody>
-                  <a:tcPr/>
-                </a:tc>
-              </a:tr>
-              <a:tr h="1219200">
-                <a:tc>
-                  <a:txBody>
-                    <a:bodyPr/>
-                    <a:lstStyle/>
-                    <a:p>
-                      <a:pPr>
-                        <a:defRPr sz="1200"/>
-                      </a:pPr>
-                      <a:r>
-                        <a:t>Material Costs</a:t>
-                      </a:r>
-                    </a:p>
-                  </a:txBody>
-                  <a:tcPr/>
-                </a:tc>
-                <a:tc>
-                  <a:txBody>
-                    <a:bodyPr/>
-                    <a:lstStyle/>
-                    <a:p>
-                      <a:pPr>
-                        <a:defRPr sz="1200"/>
-                      </a:pPr>
-                      <a:r>
-                        <a:t>$5000</a:t>
-                      </a:r>
-                    </a:p>
-                  </a:txBody>
-                  <a:tcPr/>
-                </a:tc>
-                <a:tc>
-                  <a:txBody>
-                    <a:bodyPr/>
-                    <a:lstStyle/>
-                    <a:p>
-                      <a:pPr>
-                        <a:defRPr sz="1200"/>
-                      </a:pPr>
-                      <a:r>
-                        <a:t>220</a:t>
-                      </a:r>
-                    </a:p>
-                  </a:txBody>
-                  <a:tcPr/>
-                </a:tc>
-                <a:tc>
-                  <a:txBody>
-                    <a:bodyPr/>
-                    <a:lstStyle/>
-                    <a:p>
-                      <a:pPr>
-                        <a:defRPr sz="1200"/>
-                      </a:pPr>
-                      <a:r>
-                        <a:t>CIM - Page 34</a:t>
-                      </a:r>
-                    </a:p>
-                  </a:txBody>
-                  <a:tcPr/>
-                </a:tc>
-              </a:tr>
-              <a:tr h="1219200">
-                <a:tc>
-                  <a:txBody>
-                    <a:bodyPr/>
-                    <a:lstStyle/>
-                    <a:p>
-                      <a:pPr>
-                        <a:defRPr sz="1200"/>
-                      </a:pPr>
-                      <a:r>
-                        <a:t>Production Overheads</a:t>
-                      </a:r>
-                    </a:p>
-                  </a:txBody>
-                  <a:tcPr/>
-                </a:tc>
-                <a:tc>
-                  <a:txBody>
-                    <a:bodyPr/>
-                    <a:lstStyle/>
-                    <a:p>
-                      <a:pPr>
-                        <a:defRPr sz="1200"/>
-                      </a:pPr>
-                      <a:r>
-                        <a:t>$8000</a:t>
-                      </a:r>
-                    </a:p>
-                  </a:txBody>
-                  <a:tcPr/>
-                </a:tc>
-                <a:tc>
-                  <a:txBody>
-                    <a:bodyPr/>
-                    <a:lstStyle/>
-                    <a:p>
-                      <a:pPr>
-                        <a:defRPr sz="1200"/>
-                      </a:pPr>
-                      <a:r>
-                        <a:t>200</a:t>
-                      </a:r>
-                    </a:p>
-                  </a:txBody>
-                  <a:tcPr/>
-                </a:tc>
-                <a:tc>
-                  <a:txBody>
-                    <a:bodyPr/>
-                    <a:lstStyle/>
-                    <a:p>
-                      <a:pPr>
-                        <a:defRPr sz="1200"/>
-                      </a:pPr>
-                      <a:r>
-                        <a:t>CIM - Page 34</a:t>
-                      </a:r>
-                    </a:p>
-                  </a:txBody>
-                  <a:tcPr/>
+                  <a:tcPr>
+                    <a:solidFill>
+                      <a:srgbClr val="000000"/>
+                    </a:solidFill>
+                  </a:tcPr>
                 </a:tc>
               </a:tr>
             </a:tbl>
@@ -3707,7 +3492,7 @@
           <a:lstStyle/>
           <a:p>
             <a:r>
-              <a:t>Employee Overview</a:t>
+              <a:t>Firm Employees</a:t>
             </a:r>
           </a:p>
         </p:txBody>
@@ -3736,7 +3521,7 @@
                 <a:gridCol w="1828800"/>
                 <a:gridCol w="1828800"/>
               </a:tblGrid>
-              <a:tr h="406400">
+              <a:tr h="3657600">
                 <a:tc>
                   <a:txBody>
                     <a:bodyPr/>
@@ -3754,7 +3539,11 @@
                       </a:r>
                     </a:p>
                   </a:txBody>
-                  <a:tcPr/>
+                  <a:tcPr>
+                    <a:solidFill>
+                      <a:srgbClr val="000000"/>
+                    </a:solidFill>
+                  </a:tcPr>
                 </a:tc>
                 <a:tc>
                   <a:txBody>
@@ -3773,7 +3562,11 @@
                       </a:r>
                     </a:p>
                   </a:txBody>
-                  <a:tcPr/>
+                  <a:tcPr>
+                    <a:solidFill>
+                      <a:srgbClr val="000000"/>
+                    </a:solidFill>
+                  </a:tcPr>
                 </a:tc>
                 <a:tc>
                   <a:txBody>
@@ -3792,7 +3585,11 @@
                       </a:r>
                     </a:p>
                   </a:txBody>
-                  <a:tcPr/>
+                  <a:tcPr>
+                    <a:solidFill>
+                      <a:srgbClr val="000000"/>
+                    </a:solidFill>
+                  </a:tcPr>
                 </a:tc>
                 <a:tc>
                   <a:txBody>
@@ -3811,503 +3608,11 @@
                       </a:r>
                     </a:p>
                   </a:txBody>
-                  <a:tcPr/>
-                </a:tc>
-              </a:tr>
-              <a:tr h="406400">
-                <a:tc>
-                  <a:txBody>
-                    <a:bodyPr/>
-                    <a:lstStyle/>
-                    <a:p>
-                      <a:pPr>
-                        <a:defRPr sz="1200"/>
-                      </a:pPr>
-                      <a:r>
-                        <a:t>Vice President Customer Relations</a:t>
-                      </a:r>
-                    </a:p>
-                  </a:txBody>
-                  <a:tcPr/>
-                </a:tc>
-                <a:tc>
-                  <a:txBody>
-                    <a:bodyPr/>
-                    <a:lstStyle/>
-                    <a:p>
-                      <a:pPr>
-                        <a:defRPr sz="1200"/>
-                      </a:pPr>
-                      <a:r>
-                        <a:t>1</a:t>
-                      </a:r>
-                    </a:p>
-                  </a:txBody>
-                  <a:tcPr/>
-                </a:tc>
-                <a:tc>
-                  <a:txBody>
-                    <a:bodyPr/>
-                    <a:lstStyle/>
-                    <a:p>
-                      <a:pPr>
-                        <a:defRPr sz="1200"/>
-                      </a:pPr>
-                      <a:r>
-                        <a:t>$150000/yr</a:t>
-                      </a:r>
-                    </a:p>
-                  </a:txBody>
-                  <a:tcPr/>
-                </a:tc>
-                <a:tc>
-                  <a:txBody>
-                    <a:bodyPr/>
-                    <a:lstStyle/>
-                    <a:p>
-                      <a:pPr>
-                        <a:defRPr sz="1200"/>
-                      </a:pPr>
-                      <a:r>
-                        <a:t>160</a:t>
-                      </a:r>
-                    </a:p>
-                  </a:txBody>
-                  <a:tcPr/>
-                </a:tc>
-              </a:tr>
-              <a:tr h="406400">
-                <a:tc>
-                  <a:txBody>
-                    <a:bodyPr/>
-                    <a:lstStyle/>
-                    <a:p>
-                      <a:pPr>
-                        <a:defRPr sz="1200"/>
-                      </a:pPr>
-                      <a:r>
-                        <a:t>Director of Research and Technology Development</a:t>
-                      </a:r>
-                    </a:p>
-                  </a:txBody>
-                  <a:tcPr/>
-                </a:tc>
-                <a:tc>
-                  <a:txBody>
-                    <a:bodyPr/>
-                    <a:lstStyle/>
-                    <a:p>
-                      <a:pPr>
-                        <a:defRPr sz="1200"/>
-                      </a:pPr>
-                      <a:r>
-                        <a:t>1</a:t>
-                      </a:r>
-                    </a:p>
-                  </a:txBody>
-                  <a:tcPr/>
-                </a:tc>
-                <a:tc>
-                  <a:txBody>
-                    <a:bodyPr/>
-                    <a:lstStyle/>
-                    <a:p>
-                      <a:pPr>
-                        <a:defRPr sz="1200"/>
-                      </a:pPr>
-                      <a:r>
-                        <a:t>$140000/yr</a:t>
-                      </a:r>
-                    </a:p>
-                  </a:txBody>
-                  <a:tcPr/>
-                </a:tc>
-                <a:tc>
-                  <a:txBody>
-                    <a:bodyPr/>
-                    <a:lstStyle/>
-                    <a:p>
-                      <a:pPr>
-                        <a:defRPr sz="1200"/>
-                      </a:pPr>
-                      <a:r>
-                        <a:t>160</a:t>
-                      </a:r>
-                    </a:p>
-                  </a:txBody>
-                  <a:tcPr/>
-                </a:tc>
-              </a:tr>
-              <a:tr h="406400">
-                <a:tc>
-                  <a:txBody>
-                    <a:bodyPr/>
-                    <a:lstStyle/>
-                    <a:p>
-                      <a:pPr>
-                        <a:defRPr sz="1200"/>
-                      </a:pPr>
-                      <a:r>
-                        <a:t>Senior Scientist</a:t>
-                      </a:r>
-                    </a:p>
-                  </a:txBody>
-                  <a:tcPr/>
-                </a:tc>
-                <a:tc>
-                  <a:txBody>
-                    <a:bodyPr/>
-                    <a:lstStyle/>
-                    <a:p>
-                      <a:pPr>
-                        <a:defRPr sz="1200"/>
-                      </a:pPr>
-                      <a:r>
-                        <a:t>1</a:t>
-                      </a:r>
-                    </a:p>
-                  </a:txBody>
-                  <a:tcPr/>
-                </a:tc>
-                <a:tc>
-                  <a:txBody>
-                    <a:bodyPr/>
-                    <a:lstStyle/>
-                    <a:p>
-                      <a:pPr>
-                        <a:defRPr sz="1200"/>
-                      </a:pPr>
-                      <a:r>
-                        <a:t>$139000/yr</a:t>
-                      </a:r>
-                    </a:p>
-                  </a:txBody>
-                  <a:tcPr/>
-                </a:tc>
-                <a:tc>
-                  <a:txBody>
-                    <a:bodyPr/>
-                    <a:lstStyle/>
-                    <a:p>
-                      <a:pPr>
-                        <a:defRPr sz="1200"/>
-                      </a:pPr>
-                      <a:r>
-                        <a:t>160</a:t>
-                      </a:r>
-                    </a:p>
-                  </a:txBody>
-                  <a:tcPr/>
-                </a:tc>
-              </a:tr>
-              <a:tr h="406400">
-                <a:tc>
-                  <a:txBody>
-                    <a:bodyPr/>
-                    <a:lstStyle/>
-                    <a:p>
-                      <a:pPr>
-                        <a:defRPr sz="1200"/>
-                      </a:pPr>
-                      <a:r>
-                        <a:t>Manufacturing Specialists</a:t>
-                      </a:r>
-                    </a:p>
-                  </a:txBody>
-                  <a:tcPr/>
-                </a:tc>
-                <a:tc>
-                  <a:txBody>
-                    <a:bodyPr/>
-                    <a:lstStyle/>
-                    <a:p>
-                      <a:pPr>
-                        <a:defRPr sz="1200"/>
-                      </a:pPr>
-                      <a:r>
-                        <a:t>47</a:t>
-                      </a:r>
-                    </a:p>
-                  </a:txBody>
-                  <a:tcPr/>
-                </a:tc>
-                <a:tc>
-                  <a:txBody>
-                    <a:bodyPr/>
-                    <a:lstStyle/>
-                    <a:p>
-                      <a:pPr>
-                        <a:defRPr sz="1200"/>
-                      </a:pPr>
-                      <a:r>
-                        <a:t>$50000/yr</a:t>
-                      </a:r>
-                    </a:p>
-                  </a:txBody>
-                  <a:tcPr/>
-                </a:tc>
-                <a:tc>
-                  <a:txBody>
-                    <a:bodyPr/>
-                    <a:lstStyle/>
-                    <a:p>
-                      <a:pPr>
-                        <a:defRPr sz="1200"/>
-                      </a:pPr>
-                      <a:r>
-                        <a:t>160</a:t>
-                      </a:r>
-                    </a:p>
-                  </a:txBody>
-                  <a:tcPr/>
-                </a:tc>
-              </a:tr>
-              <a:tr h="406400">
-                <a:tc>
-                  <a:txBody>
-                    <a:bodyPr/>
-                    <a:lstStyle/>
-                    <a:p>
-                      <a:pPr>
-                        <a:defRPr sz="1200"/>
-                      </a:pPr>
-                      <a:r>
-                        <a:t>Office Support Staff</a:t>
-                      </a:r>
-                    </a:p>
-                  </a:txBody>
-                  <a:tcPr/>
-                </a:tc>
-                <a:tc>
-                  <a:txBody>
-                    <a:bodyPr/>
-                    <a:lstStyle/>
-                    <a:p>
-                      <a:pPr>
-                        <a:defRPr sz="1200"/>
-                      </a:pPr>
-                      <a:r>
-                        <a:t>30</a:t>
-                      </a:r>
-                    </a:p>
-                  </a:txBody>
-                  <a:tcPr/>
-                </a:tc>
-                <a:tc>
-                  <a:txBody>
-                    <a:bodyPr/>
-                    <a:lstStyle/>
-                    <a:p>
-                      <a:pPr>
-                        <a:defRPr sz="1200"/>
-                      </a:pPr>
-                      <a:r>
-                        <a:t>$45000/yr</a:t>
-                      </a:r>
-                    </a:p>
-                  </a:txBody>
-                  <a:tcPr/>
-                </a:tc>
-                <a:tc>
-                  <a:txBody>
-                    <a:bodyPr/>
-                    <a:lstStyle/>
-                    <a:p>
-                      <a:pPr>
-                        <a:defRPr sz="1200"/>
-                      </a:pPr>
-                      <a:r>
-                        <a:t>160</a:t>
-                      </a:r>
-                    </a:p>
-                  </a:txBody>
-                  <a:tcPr/>
-                </a:tc>
-              </a:tr>
-              <a:tr h="406400">
-                <a:tc>
-                  <a:txBody>
-                    <a:bodyPr/>
-                    <a:lstStyle/>
-                    <a:p>
-                      <a:pPr>
-                        <a:defRPr sz="1200"/>
-                      </a:pPr>
-                      <a:r>
-                        <a:t>Quality Assurance Manager</a:t>
-                      </a:r>
-                    </a:p>
-                  </a:txBody>
-                  <a:tcPr/>
-                </a:tc>
-                <a:tc>
-                  <a:txBody>
-                    <a:bodyPr/>
-                    <a:lstStyle/>
-                    <a:p>
-                      <a:pPr>
-                        <a:defRPr sz="1200"/>
-                      </a:pPr>
-                      <a:r>
-                        <a:t>1</a:t>
-                      </a:r>
-                    </a:p>
-                  </a:txBody>
-                  <a:tcPr/>
-                </a:tc>
-                <a:tc>
-                  <a:txBody>
-                    <a:bodyPr/>
-                    <a:lstStyle/>
-                    <a:p>
-                      <a:pPr>
-                        <a:defRPr sz="1200"/>
-                      </a:pPr>
-                      <a:r>
-                        <a:t>$80000/yr</a:t>
-                      </a:r>
-                    </a:p>
-                  </a:txBody>
-                  <a:tcPr/>
-                </a:tc>
-                <a:tc>
-                  <a:txBody>
-                    <a:bodyPr/>
-                    <a:lstStyle/>
-                    <a:p>
-                      <a:pPr>
-                        <a:defRPr sz="1200"/>
-                      </a:pPr>
-                      <a:r>
-                        <a:t>160</a:t>
-                      </a:r>
-                    </a:p>
-                  </a:txBody>
-                  <a:tcPr/>
-                </a:tc>
-              </a:tr>
-              <a:tr h="406400">
-                <a:tc>
-                  <a:txBody>
-                    <a:bodyPr/>
-                    <a:lstStyle/>
-                    <a:p>
-                      <a:pPr>
-                        <a:defRPr sz="1200"/>
-                      </a:pPr>
-                      <a:r>
-                        <a:t>Plant Manager</a:t>
-                      </a:r>
-                    </a:p>
-                  </a:txBody>
-                  <a:tcPr/>
-                </a:tc>
-                <a:tc>
-                  <a:txBody>
-                    <a:bodyPr/>
-                    <a:lstStyle/>
-                    <a:p>
-                      <a:pPr>
-                        <a:defRPr sz="1200"/>
-                      </a:pPr>
-                      <a:r>
-                        <a:t>2</a:t>
-                      </a:r>
-                    </a:p>
-                  </a:txBody>
-                  <a:tcPr/>
-                </a:tc>
-                <a:tc>
-                  <a:txBody>
-                    <a:bodyPr/>
-                    <a:lstStyle/>
-                    <a:p>
-                      <a:pPr>
-                        <a:defRPr sz="1200"/>
-                      </a:pPr>
-                      <a:r>
-                        <a:t>$130000/yr</a:t>
-                      </a:r>
-                    </a:p>
-                  </a:txBody>
-                  <a:tcPr/>
-                </a:tc>
-                <a:tc>
-                  <a:txBody>
-                    <a:bodyPr/>
-                    <a:lstStyle/>
-                    <a:p>
-                      <a:pPr>
-                        <a:defRPr sz="1200"/>
-                      </a:pPr>
-                      <a:r>
-                        <a:t>160</a:t>
-                      </a:r>
-                    </a:p>
-                  </a:txBody>
-                  <a:tcPr/>
-                </a:tc>
-              </a:tr>
-              <a:tr h="406400">
-                <a:tc>
-                  <a:txBody>
-                    <a:bodyPr/>
-                    <a:lstStyle/>
-                    <a:p>
-                      <a:pPr>
-                        <a:defRPr sz="1200"/>
-                      </a:pPr>
-                      <a:r>
-                        <a:t>Research &amp; Development Technicians</a:t>
-                      </a:r>
-                    </a:p>
-                  </a:txBody>
-                  <a:tcPr/>
-                </a:tc>
-                <a:tc>
-                  <a:txBody>
-                    <a:bodyPr/>
-                    <a:lstStyle/>
-                    <a:p>
-                      <a:pPr>
-                        <a:defRPr sz="1200"/>
-                      </a:pPr>
-                      <a:r>
-                        <a:t>3</a:t>
-                      </a:r>
-                    </a:p>
-                  </a:txBody>
-                  <a:tcPr/>
-                </a:tc>
-                <a:tc>
-                  <a:txBody>
-                    <a:bodyPr/>
-                    <a:lstStyle/>
-                    <a:p>
-                      <a:pPr>
-                        <a:defRPr sz="1200"/>
-                      </a:pPr>
-                      <a:r>
-                        <a:t>$65000/yr</a:t>
-                      </a:r>
-                    </a:p>
-                  </a:txBody>
-                  <a:tcPr/>
-                </a:tc>
-                <a:tc>
-                  <a:txBody>
-                    <a:bodyPr/>
-                    <a:lstStyle/>
-                    <a:p>
-                      <a:pPr>
-                        <a:defRPr sz="1200"/>
-                      </a:pPr>
-                      <a:r>
-                        <a:t>160</a:t>
-                      </a:r>
-                    </a:p>
-                  </a:txBody>
-                  <a:tcPr/>
+                  <a:tcPr>
+                    <a:solidFill>
+                      <a:srgbClr val="000000"/>
+                    </a:solidFill>
+                  </a:tcPr>
                 </a:tc>
               </a:tr>
             </a:tbl>
@@ -4376,7 +3681,7 @@
                 <a:gridCol w="2438400"/>
                 <a:gridCol w="2438400"/>
               </a:tblGrid>
-              <a:tr h="914400">
+              <a:tr h="2743200">
                 <a:tc>
                   <a:txBody>
                     <a:bodyPr/>
@@ -4394,7 +3699,11 @@
                       </a:r>
                     </a:p>
                   </a:txBody>
-                  <a:tcPr/>
+                  <a:tcPr>
+                    <a:solidFill>
+                      <a:srgbClr val="000000"/>
+                    </a:solidFill>
+                  </a:tcPr>
                 </a:tc>
                 <a:tc>
                   <a:txBody>
@@ -4413,7 +3722,11 @@
                       </a:r>
                     </a:p>
                   </a:txBody>
-                  <a:tcPr/>
+                  <a:tcPr>
+                    <a:solidFill>
+                      <a:srgbClr val="000000"/>
+                    </a:solidFill>
+                  </a:tcPr>
                 </a:tc>
                 <a:tc>
                   <a:txBody>
@@ -4432,101 +3745,11 @@
                       </a:r>
                     </a:p>
                   </a:txBody>
-                  <a:tcPr/>
-                </a:tc>
-              </a:tr>
-              <a:tr h="914400">
-                <a:tc>
-                  <a:txBody>
-                    <a:bodyPr/>
-                    <a:lstStyle/>
-                    <a:p>
-                      <a:pPr>
-                        <a:defRPr sz="1200"/>
-                      </a:pPr>
-                      <a:r>
-                        <a:t>Selling and Administrative</a:t>
-                      </a:r>
-                    </a:p>
-                  </a:txBody>
-                  <a:tcPr/>
-                </a:tc>
-                <a:tc>
-                  <a:txBody>
-                    <a:bodyPr/>
-                    <a:lstStyle/>
-                    <a:p>
-                      <a:pPr>
-                        <a:defRPr sz="1200"/>
-                      </a:pPr>
-                      <a:r>
-                        <a:t>$2591862</a:t>
-                      </a:r>
-                    </a:p>
-                  </a:txBody>
-                  <a:tcPr/>
-                </a:tc>
-                <a:tc>
-                  <a:txBody>
-                    <a:bodyPr/>
-                    <a:lstStyle/>
-                    <a:p>
-                      <a:pPr>
-                        <a:defRPr sz="1200"/>
-                      </a:pPr>
-                      <a:r>
-                        <a:t>Annual</a:t>
-                      </a:r>
-                    </a:p>
-                  </a:txBody>
-                  <a:tcPr/>
-                </a:tc>
-              </a:tr>
-              <a:tr h="914400">
-                <a:tc>
-                  <a:txBody>
-                    <a:bodyPr/>
-                    <a:lstStyle/>
-                    <a:p>
-                      <a:pPr>
-                        <a:defRPr sz="1200"/>
-                      </a:pPr>
-                      <a:r>
-                        <a:t>Depreciation</a:t>
-                      </a:r>
-                    </a:p>
-                  </a:txBody>
-                  <a:tcPr/>
-                </a:tc>
-                <a:tc>
-                  <a:txBody>
-                    <a:bodyPr/>
-                    <a:lstStyle/>
-                    <a:p>
-                      <a:pPr>
-                        <a:defRPr sz="1200"/>
-                      </a:pPr>
-                      <a:r>
-                        <a:t>$626804</a:t>
-                      </a:r>
-                    </a:p>
-                  </a:txBody>
-                  <a:tcPr/>
-                </a:tc>
-                <a:tc>
-                  <a:txBody>
-                    <a:bodyPr/>
-                    <a:lstStyle/>
-                    <a:p>
-                      <a:pPr>
-                        <a:defRPr sz="1200"/>
-                      </a:pPr>
-                      <a:r>
-                        <a:t>Annual</a:t>
-                      </a:r>
-                    </a:p>
-                  </a:txBody>
-                  <a:tcPr/>
+                  <a:tcPr>
+                    <a:solidFill>
+                      <a:srgbClr val="000000"/>
+                    </a:solidFill>
+                  </a:tcPr>
                 </a:tc>
               </a:tr>
             </a:tbl>
@@ -4596,7 +3819,7 @@
                 <a:gridCol w="1828800"/>
                 <a:gridCol w="1828800"/>
               </a:tblGrid>
-              <a:tr h="548640">
+              <a:tr h="2743200">
                 <a:tc>
                   <a:txBody>
                     <a:bodyPr/>
@@ -4614,7 +3837,11 @@
                       </a:r>
                     </a:p>
                   </a:txBody>
-                  <a:tcPr/>
+                  <a:tcPr>
+                    <a:solidFill>
+                      <a:srgbClr val="000000"/>
+                    </a:solidFill>
+                  </a:tcPr>
                 </a:tc>
                 <a:tc>
                   <a:txBody>
@@ -4633,7 +3860,11 @@
                       </a:r>
                     </a:p>
                   </a:txBody>
-                  <a:tcPr/>
+                  <a:tcPr>
+                    <a:solidFill>
+                      <a:srgbClr val="000000"/>
+                    </a:solidFill>
+                  </a:tcPr>
                 </a:tc>
                 <a:tc>
                   <a:txBody>
@@ -4652,7 +3883,11 @@
                       </a:r>
                     </a:p>
                   </a:txBody>
-                  <a:tcPr/>
+                  <a:tcPr>
+                    <a:solidFill>
+                      <a:srgbClr val="000000"/>
+                    </a:solidFill>
+                  </a:tcPr>
                 </a:tc>
                 <a:tc>
                   <a:txBody>
@@ -4671,24 +3906,105 @@
                       </a:r>
                     </a:p>
                   </a:txBody>
-                  <a:tcPr/>
+                  <a:tcPr>
+                    <a:solidFill>
+                      <a:srgbClr val="000000"/>
+                    </a:solidFill>
+                  </a:tcPr>
                 </a:tc>
               </a:tr>
-              <a:tr h="548640">
+            </a:tbl>
+          </a:graphicData>
+        </a:graphic>
+      </p:graphicFrame>
+    </p:spTree>
+  </p:cSld>
+  <p:clrMapOvr>
+    <a:masterClrMapping/>
+  </p:clrMapOvr>
+</p:sld>
+</file>
+
+<file path=ppt/slides/slide7.xml><?xml version="1.0" encoding="utf-8"?>
+<p:sld xmlns:a="http://schemas.openxmlformats.org/drawingml/2006/main" xmlns:p="http://schemas.openxmlformats.org/presentationml/2006/main" xmlns:r="http://schemas.openxmlformats.org/officeDocument/2006/relationships">
+  <p:cSld>
+    <p:spTree>
+      <p:nvGrpSpPr>
+        <p:cNvPr id="1" name=""/>
+        <p:cNvGrpSpPr/>
+        <p:nvPr/>
+      </p:nvGrpSpPr>
+      <p:grpSpPr/>
+      <p:sp>
+        <p:nvSpPr>
+          <p:cNvPr id="2" name="Title 1"/>
+          <p:cNvSpPr>
+            <a:spLocks noGrp="1"/>
+          </p:cNvSpPr>
+          <p:nvPr>
+            <p:ph type="title"/>
+          </p:nvPr>
+        </p:nvSpPr>
+        <p:spPr/>
+        <p:txBody>
+          <a:bodyPr/>
+          <a:lstStyle/>
+          <a:p>
+            <a:r>
+              <a:t>Historical Financial Performance</a:t>
+            </a:r>
+          </a:p>
+        </p:txBody>
+      </p:sp>
+      <p:graphicFrame>
+        <p:nvGraphicFramePr>
+          <p:cNvPr id="3" name="Table 2"/>
+          <p:cNvGraphicFramePr>
+            <a:graphicFrameLocks noGrp="1"/>
+          </p:cNvGraphicFramePr>
+          <p:nvPr/>
+        </p:nvGraphicFramePr>
+        <p:xfrm>
+          <a:off x="914400" y="1371600"/>
+          <a:ext cx="7315200" cy="2743200"/>
+        </p:xfrm>
+        <a:graphic>
+          <a:graphicData uri="http://schemas.openxmlformats.org/drawingml/2006/table">
+            <a:tbl>
+              <a:tblPr firstRow="1" bandRow="1">
+                <a:tableStyleId>{5C22544A-7EE6-4342-B048-85BDC9FD1C3A}</a:tableStyleId>
+              </a:tblPr>
+              <a:tblGrid>
+                <a:gridCol w="1219200"/>
+                <a:gridCol w="1219200"/>
+                <a:gridCol w="1219200"/>
+                <a:gridCol w="1219200"/>
+                <a:gridCol w="1219200"/>
+                <a:gridCol w="1219200"/>
+              </a:tblGrid>
+              <a:tr h="2743200">
                 <a:tc>
                   <a:txBody>
                     <a:bodyPr/>
                     <a:lstStyle/>
                     <a:p>
                       <a:pPr>
-                        <a:defRPr sz="1200"/>
+                        <a:defRPr b="1" sz="1400">
+                          <a:solidFill>
+                            <a:srgbClr val="FFFFFF"/>
+                          </a:solidFill>
+                        </a:defRPr>
                       </a:pPr>
                       <a:r>
-                        <a:t>Machinery and Equipment</a:t>
+                        <a:t>Year</a:t>
                       </a:r>
                     </a:p>
                   </a:txBody>
-                  <a:tcPr/>
+                  <a:tcPr>
+                    <a:solidFill>
+                      <a:srgbClr val="000000"/>
+                    </a:solidFill>
+                  </a:tcPr>
                 </a:tc>
                 <a:tc>
                   <a:txBody>
@@ -4696,14 +4012,22 @@
                     <a:lstStyle/>
                     <a:p>
                       <a:pPr>
-                        <a:defRPr sz="1200"/>
+                        <a:defRPr b="1" sz="1400">
+                          <a:solidFill>
+                            <a:srgbClr val="FFFFFF"/>
+                          </a:solidFill>
+                        </a:defRPr>
                       </a:pPr>
                       <a:r>
-                        <a:t>$425000</a:t>
+                        <a:t>Revenue</a:t>
                       </a:r>
                     </a:p>
                   </a:txBody>
-                  <a:tcPr/>
+                  <a:tcPr>
+                    <a:solidFill>
+                      <a:srgbClr val="000000"/>
+                    </a:solidFill>
+                  </a:tcPr>
                 </a:tc>
                 <a:tc>
                   <a:txBody>
@@ -4711,14 +4035,22 @@
                     <a:lstStyle/>
                     <a:p>
                       <a:pPr>
-                        <a:defRPr sz="1200"/>
+                        <a:defRPr b="1" sz="1400">
+                          <a:solidFill>
+                            <a:srgbClr val="FFFFFF"/>
+                          </a:solidFill>
+                        </a:defRPr>
                       </a:pPr>
                       <a:r>
-                        <a:t>2023</a:t>
+                        <a:t>EBITDA</a:t>
                       </a:r>
                     </a:p>
                   </a:txBody>
-                  <a:tcPr/>
+                  <a:tcPr>
+                    <a:solidFill>
+                      <a:srgbClr val="000000"/>
+                    </a:solidFill>
+                  </a:tcPr>
                 </a:tc>
                 <a:tc>
                   <a:txBody>
@@ -4726,31 +4058,22 @@
                     <a:lstStyle/>
                     <a:p>
                       <a:pPr>
-                        <a:defRPr sz="1200"/>
+                        <a:defRPr b="1" sz="1400">
+                          <a:solidFill>
+                            <a:srgbClr val="FFFFFF"/>
+                          </a:solidFill>
+                        </a:defRPr>
                       </a:pPr>
                       <a:r>
-                        <a:t>10 years</a:t>
+                        <a:t>EBIT</a:t>
                       </a:r>
                     </a:p>
                   </a:txBody>
-                  <a:tcPr/>
-                </a:tc>
-              </a:tr>
-              <a:tr h="548640">
-                <a:tc>
-                  <a:txBody>
-                    <a:bodyPr/>
-                    <a:lstStyle/>
-                    <a:p>
-                      <a:pPr>
-                        <a:defRPr sz="1200"/>
-                      </a:pPr>
-                      <a:r>
-                        <a:t>Facility Improvements</a:t>
-                      </a:r>
-                    </a:p>
-                  </a:txBody>
-                  <a:tcPr/>
+                  <a:tcPr>
+                    <a:solidFill>
+                      <a:srgbClr val="000000"/>
+                    </a:solidFill>
+                  </a:tcPr>
                 </a:tc>
                 <a:tc>
                   <a:txBody>
@@ -4758,14 +4081,22 @@
                     <a:lstStyle/>
                     <a:p>
                       <a:pPr>
-                        <a:defRPr sz="1200"/>
+                        <a:defRPr b="1" sz="1400">
+                          <a:solidFill>
+                            <a:srgbClr val="FFFFFF"/>
+                          </a:solidFill>
+                        </a:defRPr>
                       </a:pPr>
                       <a:r>
-                        <a:t>$163000</a:t>
+                        <a:t>Net Income</a:t>
                       </a:r>
                     </a:p>
                   </a:txBody>
-                  <a:tcPr/>
+                  <a:tcPr>
+                    <a:solidFill>
+                      <a:srgbClr val="000000"/>
+                    </a:solidFill>
+                  </a:tcPr>
                 </a:tc>
                 <a:tc>
                   <a:txBody>
@@ -4773,153 +4104,22 @@
                     <a:lstStyle/>
                     <a:p>
                       <a:pPr>
-                        <a:defRPr sz="1200"/>
+                        <a:defRPr b="1" sz="1400">
+                          <a:solidFill>
+                            <a:srgbClr val="FFFFFF"/>
+                          </a:solidFill>
+                        </a:defRPr>
                       </a:pPr>
                       <a:r>
-                        <a:t>2023</a:t>
+                        <a:t>EBITDA Margin</a:t>
                       </a:r>
                     </a:p>
                   </a:txBody>
-                  <a:tcPr/>
-                </a:tc>
-                <a:tc>
-                  <a:txBody>
-                    <a:bodyPr/>
-                    <a:lstStyle/>
-                    <a:p>
-                      <a:pPr>
-                        <a:defRPr sz="1200"/>
-                      </a:pPr>
-                      <a:r>
-                        <a:t>15 years</a:t>
-                      </a:r>
-                    </a:p>
-                  </a:txBody>
-                  <a:tcPr/>
-                </a:tc>
-              </a:tr>
-              <a:tr h="548640">
-                <a:tc>
-                  <a:txBody>
-                    <a:bodyPr/>
-                    <a:lstStyle/>
-                    <a:p>
-                      <a:pPr>
-                        <a:defRPr sz="1200"/>
-                      </a:pPr>
-                      <a:r>
-                        <a:t>New Computer System</a:t>
-                      </a:r>
-                    </a:p>
-                  </a:txBody>
-                  <a:tcPr/>
-                </a:tc>
-                <a:tc>
-                  <a:txBody>
-                    <a:bodyPr/>
-                    <a:lstStyle/>
-                    <a:p>
-                      <a:pPr>
-                        <a:defRPr sz="1200"/>
-                      </a:pPr>
-                      <a:r>
-                        <a:t>$1208937</a:t>
-                      </a:r>
-                    </a:p>
-                  </a:txBody>
-                  <a:tcPr/>
-                </a:tc>
-                <a:tc>
-                  <a:txBody>
-                    <a:bodyPr/>
-                    <a:lstStyle/>
-                    <a:p>
-                      <a:pPr>
-                        <a:defRPr sz="1200"/>
-                      </a:pPr>
-                      <a:r>
-                        <a:t>2015</a:t>
-                      </a:r>
-                    </a:p>
-                  </a:txBody>
-                  <a:tcPr/>
-                </a:tc>
-                <a:tc>
-                  <a:txBody>
-                    <a:bodyPr/>
-                    <a:lstStyle/>
-                    <a:p>
-                      <a:pPr>
-                        <a:defRPr sz="1200"/>
-                      </a:pPr>
-                      <a:r>
-                        <a:t>5 years</a:t>
-                      </a:r>
-                    </a:p>
-                  </a:txBody>
-                  <a:tcPr/>
-                </a:tc>
-              </a:tr>
-              <a:tr h="548640">
-                <a:tc>
-                  <a:txBody>
-                    <a:bodyPr/>
-                    <a:lstStyle/>
-                    <a:p>
-                      <a:pPr>
-                        <a:defRPr sz="1200"/>
-                      </a:pPr>
-                      <a:r>
-                        <a:t>Real Estate Investments</a:t>
-                      </a:r>
-                    </a:p>
-                  </a:txBody>
-                  <a:tcPr/>
-                </a:tc>
-                <a:tc>
-                  <a:txBody>
-                    <a:bodyPr/>
-                    <a:lstStyle/>
-                    <a:p>
-                      <a:pPr>
-                        <a:defRPr sz="1200"/>
-                      </a:pPr>
-                      <a:r>
-                        <a:t>$4450000</a:t>
-                      </a:r>
-                    </a:p>
-                  </a:txBody>
-                  <a:tcPr/>
-                </a:tc>
-                <a:tc>
-                  <a:txBody>
-                    <a:bodyPr/>
-                    <a:lstStyle/>
-                    <a:p>
-                      <a:pPr>
-                        <a:defRPr sz="1200"/>
-                      </a:pPr>
-                      <a:r>
-                        <a:t>2023</a:t>
-                      </a:r>
-                    </a:p>
-                  </a:txBody>
-                  <a:tcPr/>
-                </a:tc>
-                <a:tc>
-                  <a:txBody>
-                    <a:bodyPr/>
-                    <a:lstStyle/>
-                    <a:p>
-                      <a:pPr>
-                        <a:defRPr sz="1200"/>
-                      </a:pPr>
-                      <a:r>
-                        <a:t>20 years</a:t>
-                      </a:r>
-                    </a:p>
-                  </a:txBody>
-                  <a:tcPr/>
+                  <a:tcPr>
+                    <a:solidFill>
+                      <a:srgbClr val="000000"/>
+                    </a:solidFill>
+                  </a:tcPr>
                 </a:tc>
               </a:tr>
             </a:tbl>

</xml_diff>